<commit_message>
updated a bit more
</commit_message>
<xml_diff>
--- a/presentation.pptx
+++ b/presentation.pptx
@@ -5,14 +5,15 @@
     <p:sldMasterId id="2147483673" r:id="rId1"/>
   </p:sldMasterIdLst>
   <p:notesMasterIdLst>
-    <p:notesMasterId r:id="rId7"/>
+    <p:notesMasterId r:id="rId8"/>
   </p:notesMasterIdLst>
   <p:sldIdLst>
     <p:sldId id="256" r:id="rId2"/>
     <p:sldId id="258" r:id="rId3"/>
     <p:sldId id="259" r:id="rId4"/>
-    <p:sldId id="260" r:id="rId5"/>
-    <p:sldId id="257" r:id="rId6"/>
+    <p:sldId id="261" r:id="rId5"/>
+    <p:sldId id="260" r:id="rId6"/>
+    <p:sldId id="257" r:id="rId7"/>
   </p:sldIdLst>
   <p:sldSz cx="12192000" cy="6858000"/>
   <p:notesSz cx="6858000" cy="9144000"/>
@@ -111,6 +112,11 @@
       </a:defRPr>
     </a:lvl9pPr>
   </p:defaultTextStyle>
+  <p:extLst>
+    <p:ext uri="{EFAFB233-063F-42B5-8137-9DF3F51BA10A}">
+      <p15:sldGuideLst xmlns:p15="http://schemas.microsoft.com/office/powerpoint/2012/main"/>
+    </p:ext>
+  </p:extLst>
 </p:presentation>
 </file>
 
@@ -509,7 +515,7 @@
           <a:p>
             <a:r>
               <a:rPr lang="en-US" dirty="0"/>
-              <a:t>Hi, my name is William Santosa. Today, I will be introducing you to developing a bot on a platform many of us consider an integral part of our lives. In other words, I will be teaching you all how to start making your very own discord bot.</a:t>
+              <a:t>Hi, my name is William Santosa. Today, I will be introducing you to developing a bot on a platform many of us consider to be an integral part of our lives. In other words, I will be teaching you all how to start making your very own discord bot.</a:t>
             </a:r>
           </a:p>
         </p:txBody>
@@ -616,7 +622,7 @@
             </a:br>
             <a:r>
               <a:rPr lang="en-US" dirty="0"/>
-              <a:t>Secondly, the skills gained from developing a bot is very much so applicable to other areas of programming. For example, depending on the bot you decide to develop you will have to work with backend and frontend components, which is useful in full stack web applications. Additionally, creating a bot on discord is very similar to creating a bot on other platforms like Slack, and development on chat bots will help you develop other kinds of bots much more easily, like WhatsApp chat bots.</a:t>
+              <a:t>Secondly, the skills gained from developing a bot is very much so applicable to other areas of programming. For example, depending on the bot you develop you will have to work with backend and frontend components, which is useful in full stack web applications. Additionally, creating a bot on discord is very similar to creating a bot on other platforms like Slack, and development on chat bots will help you develop other kinds of bots much more easily, like WhatsApp chat bots.</a:t>
             </a:r>
           </a:p>
           <a:p>
@@ -625,7 +631,7 @@
           <a:p>
             <a:r>
               <a:rPr lang="en-US" dirty="0"/>
-              <a:t>Additionally, you also get a cool profile badge that you can claim to show others the hard work you put into your bot.</a:t>
+              <a:t>As a bonus, you can also claim a cool profile badge that shows others the hard work you put into creating your bot.</a:t>
             </a:r>
           </a:p>
         </p:txBody>
@@ -712,7 +718,100 @@
           <a:p>
             <a:r>
               <a:rPr lang="en-US" dirty="0"/>
-              <a:t>Here are a</a:t>
+              <a:t>Now, let’s learn how to set up our environment for developing the discord bot. </a:t>
+            </a:r>
+          </a:p>
+          <a:p>
+            <a:endParaRPr lang="en-US" dirty="0"/>
+          </a:p>
+          <a:p>
+            <a:r>
+              <a:rPr lang="en-US" dirty="0"/>
+              <a:t>Firstly, download JavaScript and Node.js if you haven’t already. You can follow the link later to download them.</a:t>
+            </a:r>
+          </a:p>
+          <a:p>
+            <a:endParaRPr lang="en-US" dirty="0"/>
+          </a:p>
+          <a:p>
+            <a:r>
+              <a:rPr lang="en-US" dirty="0"/>
+              <a:t>Next, assuming that your package manager is </a:t>
+            </a:r>
+            <a:r>
+              <a:rPr lang="en-US" dirty="0" err="1"/>
+              <a:t>npm</a:t>
+            </a:r>
+            <a:r>
+              <a:rPr lang="en-US" dirty="0"/>
+              <a:t>, run “</a:t>
+            </a:r>
+            <a:r>
+              <a:rPr lang="en-US" dirty="0" err="1"/>
+              <a:t>npm</a:t>
+            </a:r>
+            <a:r>
+              <a:rPr lang="en-US" dirty="0"/>
+              <a:t> </a:t>
+            </a:r>
+            <a:r>
+              <a:rPr lang="en-US" dirty="0" err="1"/>
+              <a:t>init</a:t>
+            </a:r>
+            <a:r>
+              <a:rPr lang="en-US" dirty="0"/>
+              <a:t>” in the project folder. Alternatively, you might have installed node using another manager like yarn or </a:t>
+            </a:r>
+            <a:r>
+              <a:rPr lang="en-US" dirty="0" err="1"/>
+              <a:t>pnpm</a:t>
+            </a:r>
+            <a:r>
+              <a:rPr lang="en-US" dirty="0"/>
+              <a:t>. In that case, run that package manager name then </a:t>
+            </a:r>
+            <a:r>
+              <a:rPr lang="en-US" dirty="0" err="1"/>
+              <a:t>init</a:t>
+            </a:r>
+            <a:r>
+              <a:rPr lang="en-US" dirty="0"/>
+              <a:t> instead.</a:t>
+            </a:r>
+            <a:br>
+              <a:rPr lang="en-US" dirty="0"/>
+            </a:br>
+            <a:br>
+              <a:rPr lang="en-US" dirty="0"/>
+            </a:br>
+            <a:r>
+              <a:rPr lang="en-US" dirty="0"/>
+              <a:t>After that, run </a:t>
+            </a:r>
+            <a:r>
+              <a:rPr lang="en-US" dirty="0" err="1"/>
+              <a:t>npm</a:t>
+            </a:r>
+            <a:r>
+              <a:rPr lang="en-US" dirty="0"/>
+              <a:t> install discord.js to install the required node modules and add it as a dependency to your </a:t>
+            </a:r>
+            <a:r>
+              <a:rPr lang="en-US" dirty="0" err="1"/>
+              <a:t>project.json</a:t>
+            </a:r>
+            <a:r>
+              <a:rPr lang="en-US" dirty="0"/>
+              <a:t> file.</a:t>
+            </a:r>
+          </a:p>
+          <a:p>
+            <a:endParaRPr lang="en-US" dirty="0"/>
+          </a:p>
+          <a:p>
+            <a:r>
+              <a:rPr lang="en-US" dirty="0"/>
+              <a:t>After running the commands, your directory should look like the screenshot displayed on the screen, minus the presentation and README file.</a:t>
             </a:r>
           </a:p>
         </p:txBody>
@@ -744,6 +843,90 @@
     <p:extLst>
       <p:ext uri="{BB962C8B-B14F-4D97-AF65-F5344CB8AC3E}">
         <p14:creationId xmlns:p14="http://schemas.microsoft.com/office/powerpoint/2010/main" val="1009363322"/>
+      </p:ext>
+    </p:extLst>
+  </p:cSld>
+  <p:clrMapOvr>
+    <a:masterClrMapping/>
+  </p:clrMapOvr>
+</p:notes>
+</file>
+
+<file path=ppt/notesSlides/notesSlide4.xml><?xml version="1.0" encoding="utf-8"?>
+<p:notes xmlns:a="http://schemas.openxmlformats.org/drawingml/2006/main" xmlns:r="http://schemas.openxmlformats.org/officeDocument/2006/relationships" xmlns:p="http://schemas.openxmlformats.org/presentationml/2006/main">
+  <p:cSld>
+    <p:spTree>
+      <p:nvGrpSpPr>
+        <p:cNvPr id="1" name=""/>
+        <p:cNvGrpSpPr/>
+        <p:nvPr/>
+      </p:nvGrpSpPr>
+      <p:grpSpPr>
+        <a:xfrm>
+          <a:off x="0" y="0"/>
+          <a:ext cx="0" cy="0"/>
+          <a:chOff x="0" y="0"/>
+          <a:chExt cx="0" cy="0"/>
+        </a:xfrm>
+      </p:grpSpPr>
+      <p:sp>
+        <p:nvSpPr>
+          <p:cNvPr id="2" name="Slide Image Placeholder 1"/>
+          <p:cNvSpPr>
+            <a:spLocks noGrp="1" noRot="1" noChangeAspect="1"/>
+          </p:cNvSpPr>
+          <p:nvPr>
+            <p:ph type="sldImg"/>
+          </p:nvPr>
+        </p:nvSpPr>
+        <p:spPr/>
+      </p:sp>
+      <p:sp>
+        <p:nvSpPr>
+          <p:cNvPr id="3" name="Notes Placeholder 2"/>
+          <p:cNvSpPr>
+            <a:spLocks noGrp="1"/>
+          </p:cNvSpPr>
+          <p:nvPr>
+            <p:ph type="body" idx="1"/>
+          </p:nvPr>
+        </p:nvSpPr>
+        <p:spPr/>
+        <p:txBody>
+          <a:bodyPr/>
+          <a:lstStyle/>
+          <a:p>
+            <a:endParaRPr lang="en-US" dirty="0"/>
+          </a:p>
+        </p:txBody>
+      </p:sp>
+      <p:sp>
+        <p:nvSpPr>
+          <p:cNvPr id="4" name="Slide Number Placeholder 3"/>
+          <p:cNvSpPr>
+            <a:spLocks noGrp="1"/>
+          </p:cNvSpPr>
+          <p:nvPr>
+            <p:ph type="sldNum" sz="quarter" idx="5"/>
+          </p:nvPr>
+        </p:nvSpPr>
+        <p:spPr/>
+        <p:txBody>
+          <a:bodyPr/>
+          <a:lstStyle/>
+          <a:p>
+            <a:fld id="{454AE541-6EE7-44D1-9FCC-CF00C17CFF09}" type="slidenum">
+              <a:rPr lang="en-US" smtClean="0"/>
+              <a:t>4</a:t>
+            </a:fld>
+            <a:endParaRPr lang="en-US"/>
+          </a:p>
+        </p:txBody>
+      </p:sp>
+    </p:spTree>
+    <p:extLst>
+      <p:ext uri="{BB962C8B-B14F-4D97-AF65-F5344CB8AC3E}">
+        <p14:creationId xmlns:p14="http://schemas.microsoft.com/office/powerpoint/2010/main" val="829213469"/>
       </p:ext>
     </p:extLst>
   </p:cSld>
@@ -6050,7 +6233,7 @@
           <a:p>
             <a:r>
               <a:rPr lang="en-US" dirty="0"/>
-              <a:t>Prerequisites</a:t>
+              <a:t>Setting Up</a:t>
             </a:r>
           </a:p>
         </p:txBody>
@@ -6078,11 +6261,323 @@
           <a:p>
             <a:r>
               <a:rPr lang="en-US" dirty="0"/>
-              <a:t>Some JavaScript knowledge</a:t>
-            </a:r>
-          </a:p>
-          <a:p>
+              <a:t>Download </a:t>
+            </a:r>
+            <a:r>
+              <a:rPr lang="en-US" dirty="0">
+                <a:hlinkClick r:id="rId3"/>
+              </a:rPr>
+              <a:t>JavaScript</a:t>
+            </a:r>
+            <a:r>
+              <a:rPr lang="en-US" dirty="0"/>
+              <a:t> and </a:t>
+            </a:r>
+            <a:r>
+              <a:rPr lang="en-US" dirty="0">
+                <a:hlinkClick r:id="rId4"/>
+              </a:rPr>
+              <a:t>Node.js </a:t>
+            </a:r>
+            <a:r>
+              <a:rPr lang="en-US" dirty="0"/>
+              <a:t>if you haven’t already</a:t>
+            </a:r>
+          </a:p>
+          <a:p>
+            <a:r>
+              <a:rPr lang="en-US" dirty="0"/>
+              <a:t>Run the following commands in the project directory</a:t>
+            </a:r>
+          </a:p>
+          <a:p>
+            <a:pPr lvl="2"/>
+            <a:r>
+              <a:rPr lang="en-US" dirty="0" err="1"/>
+              <a:t>npm</a:t>
+            </a:r>
+            <a:r>
+              <a:rPr lang="en-US" dirty="0"/>
+              <a:t> </a:t>
+            </a:r>
+            <a:r>
+              <a:rPr lang="en-US" dirty="0" err="1"/>
+              <a:t>init</a:t>
+            </a:r>
             <a:endParaRPr lang="en-US" dirty="0"/>
+          </a:p>
+          <a:p>
+            <a:pPr lvl="2"/>
+            <a:r>
+              <a:rPr lang="en-US" dirty="0" err="1"/>
+              <a:t>npm</a:t>
+            </a:r>
+            <a:r>
+              <a:rPr lang="en-US" dirty="0"/>
+              <a:t> install discord.js</a:t>
+            </a:r>
+          </a:p>
+        </p:txBody>
+      </p:sp>
+      <p:pic>
+        <p:nvPicPr>
+          <p:cNvPr id="5" name="Picture 4" descr="Text&#10;&#10;Description automatically generated">
+            <a:extLst>
+              <a:ext uri="{FF2B5EF4-FFF2-40B4-BE49-F238E27FC236}">
+                <a16:creationId xmlns:a16="http://schemas.microsoft.com/office/drawing/2014/main" id="{6E8DFD43-B059-54EE-395F-250C59025D3F}"/>
+              </a:ext>
+            </a:extLst>
+          </p:cNvPr>
+          <p:cNvPicPr>
+            <a:picLocks noChangeAspect="1"/>
+          </p:cNvPicPr>
+          <p:nvPr/>
+        </p:nvPicPr>
+        <p:blipFill>
+          <a:blip r:embed="rId5">
+            <a:extLst>
+              <a:ext uri="{28A0092B-C50C-407E-A947-70E740481C1C}">
+                <a14:useLocalDpi xmlns:a14="http://schemas.microsoft.com/office/drawing/2010/main" val="0"/>
+              </a:ext>
+            </a:extLst>
+          </a:blip>
+          <a:stretch>
+            <a:fillRect/>
+          </a:stretch>
+        </p:blipFill>
+        <p:spPr>
+          <a:xfrm>
+            <a:off x="8656948" y="1685925"/>
+            <a:ext cx="2786045" cy="2716393"/>
+          </a:xfrm>
+          <a:prstGeom prst="rect">
+            <a:avLst/>
+          </a:prstGeom>
+        </p:spPr>
+      </p:pic>
+      <p:sp>
+        <p:nvSpPr>
+          <p:cNvPr id="6" name="Text Placeholder 3">
+            <a:extLst>
+              <a:ext uri="{FF2B5EF4-FFF2-40B4-BE49-F238E27FC236}">
+                <a16:creationId xmlns:a16="http://schemas.microsoft.com/office/drawing/2014/main" id="{89DD4A18-F3C8-2129-C065-F6DEC8539E95}"/>
+              </a:ext>
+            </a:extLst>
+          </p:cNvPr>
+          <p:cNvSpPr txBox="1">
+            <a:spLocks/>
+          </p:cNvSpPr>
+          <p:nvPr/>
+        </p:nvSpPr>
+        <p:spPr>
+          <a:xfrm>
+            <a:off x="8656947" y="4436785"/>
+            <a:ext cx="2786045" cy="914999"/>
+          </a:xfrm>
+          <a:prstGeom prst="rect">
+            <a:avLst/>
+          </a:prstGeom>
+        </p:spPr>
+        <p:txBody>
+          <a:bodyPr vert="horz" lIns="91440" tIns="45720" rIns="91440" bIns="45720" rtlCol="0">
+            <a:normAutofit/>
+          </a:bodyPr>
+          <a:lstStyle>
+            <a:lvl1pPr marL="0" indent="0" algn="l" defTabSz="914400" rtl="0" eaLnBrk="1" latinLnBrk="0" hangingPunct="1">
+              <a:lnSpc>
+                <a:spcPct val="150000"/>
+              </a:lnSpc>
+              <a:spcBef>
+                <a:spcPts val="1000"/>
+              </a:spcBef>
+              <a:buClr>
+                <a:schemeClr val="accent3"/>
+              </a:buClr>
+              <a:buFont typeface="Wingdings" panose="05000000000000000000" pitchFamily="2" charset="2"/>
+              <a:buNone/>
+              <a:defRPr sz="2000" kern="1200" spc="50">
+                <a:solidFill>
+                  <a:schemeClr val="tx1">
+                    <a:alpha val="60000"/>
+                  </a:schemeClr>
+                </a:solidFill>
+                <a:latin typeface="+mn-lt"/>
+                <a:ea typeface="+mn-ea"/>
+                <a:cs typeface="+mn-cs"/>
+              </a:defRPr>
+            </a:lvl1pPr>
+            <a:lvl2pPr marL="457200" indent="0" algn="l" defTabSz="914400" rtl="0" eaLnBrk="1" latinLnBrk="0" hangingPunct="1">
+              <a:lnSpc>
+                <a:spcPct val="150000"/>
+              </a:lnSpc>
+              <a:spcBef>
+                <a:spcPts val="500"/>
+              </a:spcBef>
+              <a:buFontTx/>
+              <a:buNone/>
+              <a:defRPr sz="1400" b="0" i="1" kern="1200" spc="50" baseline="0">
+                <a:solidFill>
+                  <a:schemeClr val="tx1">
+                    <a:alpha val="60000"/>
+                  </a:schemeClr>
+                </a:solidFill>
+                <a:latin typeface="+mn-lt"/>
+                <a:ea typeface="+mn-ea"/>
+                <a:cs typeface="+mn-cs"/>
+              </a:defRPr>
+            </a:lvl2pPr>
+            <a:lvl3pPr marL="914400" indent="0" algn="l" defTabSz="914400" rtl="0" eaLnBrk="1" latinLnBrk="0" hangingPunct="1">
+              <a:lnSpc>
+                <a:spcPct val="150000"/>
+              </a:lnSpc>
+              <a:spcBef>
+                <a:spcPts val="500"/>
+              </a:spcBef>
+              <a:buClr>
+                <a:schemeClr val="accent3"/>
+              </a:buClr>
+              <a:buFont typeface="Wingdings" panose="05000000000000000000" pitchFamily="2" charset="2"/>
+              <a:buNone/>
+              <a:defRPr sz="1200" kern="1200" spc="50">
+                <a:solidFill>
+                  <a:schemeClr val="tx1">
+                    <a:alpha val="60000"/>
+                  </a:schemeClr>
+                </a:solidFill>
+                <a:latin typeface="+mn-lt"/>
+                <a:ea typeface="+mn-ea"/>
+                <a:cs typeface="+mn-cs"/>
+              </a:defRPr>
+            </a:lvl3pPr>
+            <a:lvl4pPr marL="1371600" indent="0" algn="l" defTabSz="914400" rtl="0" eaLnBrk="1" latinLnBrk="0" hangingPunct="1">
+              <a:lnSpc>
+                <a:spcPct val="150000"/>
+              </a:lnSpc>
+              <a:spcBef>
+                <a:spcPts val="500"/>
+              </a:spcBef>
+              <a:buClr>
+                <a:schemeClr val="accent3"/>
+              </a:buClr>
+              <a:buFontTx/>
+              <a:buNone/>
+              <a:defRPr sz="1000" b="0" i="1" kern="1200" spc="50" baseline="0">
+                <a:solidFill>
+                  <a:schemeClr val="tx1">
+                    <a:alpha val="60000"/>
+                  </a:schemeClr>
+                </a:solidFill>
+                <a:latin typeface="+mn-lt"/>
+                <a:ea typeface="+mn-ea"/>
+                <a:cs typeface="+mn-cs"/>
+              </a:defRPr>
+            </a:lvl4pPr>
+            <a:lvl5pPr marL="1828800" indent="0" algn="l" defTabSz="914400" rtl="0" eaLnBrk="1" latinLnBrk="0" hangingPunct="1">
+              <a:lnSpc>
+                <a:spcPct val="150000"/>
+              </a:lnSpc>
+              <a:spcBef>
+                <a:spcPts val="500"/>
+              </a:spcBef>
+              <a:buClr>
+                <a:schemeClr val="accent3"/>
+              </a:buClr>
+              <a:buFont typeface="Wingdings" panose="05000000000000000000" pitchFamily="2" charset="2"/>
+              <a:buNone/>
+              <a:defRPr sz="1000" kern="1200" spc="50">
+                <a:solidFill>
+                  <a:schemeClr val="tx1">
+                    <a:alpha val="60000"/>
+                  </a:schemeClr>
+                </a:solidFill>
+                <a:latin typeface="+mn-lt"/>
+                <a:ea typeface="+mn-ea"/>
+                <a:cs typeface="+mn-cs"/>
+              </a:defRPr>
+            </a:lvl5pPr>
+            <a:lvl6pPr marL="2286000" indent="0" algn="l" defTabSz="914400" rtl="0" eaLnBrk="1" latinLnBrk="0" hangingPunct="1">
+              <a:lnSpc>
+                <a:spcPct val="90000"/>
+              </a:lnSpc>
+              <a:spcBef>
+                <a:spcPts val="500"/>
+              </a:spcBef>
+              <a:buFont typeface="Arial" panose="020B0604020202020204" pitchFamily="34" charset="0"/>
+              <a:buNone/>
+              <a:defRPr sz="1000" kern="1200">
+                <a:solidFill>
+                  <a:schemeClr val="tx1"/>
+                </a:solidFill>
+                <a:latin typeface="+mn-lt"/>
+                <a:ea typeface="+mn-ea"/>
+                <a:cs typeface="+mn-cs"/>
+              </a:defRPr>
+            </a:lvl6pPr>
+            <a:lvl7pPr marL="2743200" indent="0" algn="l" defTabSz="914400" rtl="0" eaLnBrk="1" latinLnBrk="0" hangingPunct="1">
+              <a:lnSpc>
+                <a:spcPct val="90000"/>
+              </a:lnSpc>
+              <a:spcBef>
+                <a:spcPts val="500"/>
+              </a:spcBef>
+              <a:buFont typeface="Arial" panose="020B0604020202020204" pitchFamily="34" charset="0"/>
+              <a:buNone/>
+              <a:defRPr sz="1000" kern="1200">
+                <a:solidFill>
+                  <a:schemeClr val="tx1"/>
+                </a:solidFill>
+                <a:latin typeface="+mn-lt"/>
+                <a:ea typeface="+mn-ea"/>
+                <a:cs typeface="+mn-cs"/>
+              </a:defRPr>
+            </a:lvl7pPr>
+            <a:lvl8pPr marL="3200400" indent="0" algn="l" defTabSz="914400" rtl="0" eaLnBrk="1" latinLnBrk="0" hangingPunct="1">
+              <a:lnSpc>
+                <a:spcPct val="90000"/>
+              </a:lnSpc>
+              <a:spcBef>
+                <a:spcPts val="500"/>
+              </a:spcBef>
+              <a:buFont typeface="Arial" panose="020B0604020202020204" pitchFamily="34" charset="0"/>
+              <a:buNone/>
+              <a:defRPr sz="1000" kern="1200">
+                <a:solidFill>
+                  <a:schemeClr val="tx1"/>
+                </a:solidFill>
+                <a:latin typeface="+mn-lt"/>
+                <a:ea typeface="+mn-ea"/>
+                <a:cs typeface="+mn-cs"/>
+              </a:defRPr>
+            </a:lvl8pPr>
+            <a:lvl9pPr marL="3657600" indent="0" algn="l" defTabSz="914400" rtl="0" eaLnBrk="1" latinLnBrk="0" hangingPunct="1">
+              <a:lnSpc>
+                <a:spcPct val="90000"/>
+              </a:lnSpc>
+              <a:spcBef>
+                <a:spcPts val="500"/>
+              </a:spcBef>
+              <a:buFont typeface="Arial" panose="020B0604020202020204" pitchFamily="34" charset="0"/>
+              <a:buNone/>
+              <a:defRPr sz="1000" kern="1200">
+                <a:solidFill>
+                  <a:schemeClr val="tx1"/>
+                </a:solidFill>
+                <a:latin typeface="+mn-lt"/>
+                <a:ea typeface="+mn-ea"/>
+                <a:cs typeface="+mn-cs"/>
+              </a:defRPr>
+            </a:lvl9pPr>
+          </a:lstStyle>
+          <a:p>
+            <a:pPr>
+              <a:lnSpc>
+                <a:spcPct val="140000"/>
+              </a:lnSpc>
+            </a:pPr>
+            <a:r>
+              <a:rPr lang="en-US" sz="1400" dirty="0"/>
+              <a:t>Fig. 2: Directory after running commands.</a:t>
+            </a:r>
           </a:p>
         </p:txBody>
       </p:sp>
@@ -6126,10 +6621,10 @@
       </p:grpSpPr>
       <p:sp useBgFill="1">
         <p:nvSpPr>
-          <p:cNvPr id="10" name="Rectangle 9">
-            <a:extLst>
-              <a:ext uri="{FF2B5EF4-FFF2-40B4-BE49-F238E27FC236}">
-                <a16:creationId xmlns:a16="http://schemas.microsoft.com/office/drawing/2014/main" id="{DB66C9CD-6BF4-44CA-8078-0BB819080761}"/>
+          <p:cNvPr id="14" name="Rectangle 13">
+            <a:extLst>
+              <a:ext uri="{FF2B5EF4-FFF2-40B4-BE49-F238E27FC236}">
+                <a16:creationId xmlns:a16="http://schemas.microsoft.com/office/drawing/2014/main" id="{C279C8A1-C4E4-4DE9-934E-91221AC99393}"/>
               </a:ext>
               <a:ext uri="{C183D7F6-B498-43B3-948B-1728B52AA6E4}">
                 <adec:decorative xmlns:adec="http://schemas.microsoft.com/office/drawing/2017/decorative" val="1"/>
@@ -6205,6 +6700,868 @@
           <p:cNvPr id="2" name="Title 1">
             <a:extLst>
               <a:ext uri="{FF2B5EF4-FFF2-40B4-BE49-F238E27FC236}">
+                <a16:creationId xmlns:a16="http://schemas.microsoft.com/office/drawing/2014/main" id="{F7DD4568-BF73-2161-C6D0-C93FEC307004}"/>
+              </a:ext>
+            </a:extLst>
+          </p:cNvPr>
+          <p:cNvSpPr>
+            <a:spLocks noGrp="1"/>
+          </p:cNvSpPr>
+          <p:nvPr>
+            <p:ph type="title"/>
+          </p:nvPr>
+        </p:nvSpPr>
+        <p:spPr>
+          <a:xfrm>
+            <a:off x="4868987" y="395288"/>
+            <a:ext cx="6317998" cy="1120439"/>
+          </a:xfrm>
+        </p:spPr>
+        <p:txBody>
+          <a:bodyPr wrap="square" anchor="b">
+            <a:normAutofit/>
+          </a:bodyPr>
+          <a:lstStyle/>
+          <a:p>
+            <a:pPr algn="ctr"/>
+            <a:r>
+              <a:rPr lang="en-US" dirty="0"/>
+              <a:t>Setting Up (2)</a:t>
+            </a:r>
+            <a:endParaRPr lang="en-US"/>
+          </a:p>
+        </p:txBody>
+      </p:sp>
+      <p:sp>
+        <p:nvSpPr>
+          <p:cNvPr id="16" name="Rectangle 15">
+            <a:extLst>
+              <a:ext uri="{FF2B5EF4-FFF2-40B4-BE49-F238E27FC236}">
+                <a16:creationId xmlns:a16="http://schemas.microsoft.com/office/drawing/2014/main" id="{62A4A8E2-912D-4A3D-AEA6-07D6791868C6}"/>
+              </a:ext>
+              <a:ext uri="{C183D7F6-B498-43B3-948B-1728B52AA6E4}">
+                <adec:decorative xmlns:adec="http://schemas.microsoft.com/office/drawing/2017/decorative" val="1"/>
+              </a:ext>
+            </a:extLst>
+          </p:cNvPr>
+          <p:cNvSpPr>
+            <a:spLocks noGrp="1" noRot="1" noChangeAspect="1" noMove="1" noResize="1" noEditPoints="1" noAdjustHandles="1" noChangeArrowheads="1" noChangeShapeType="1" noTextEdit="1"/>
+          </p:cNvSpPr>
+          <p:nvPr>
+            <p:extLst>
+              <p:ext uri="{386F3935-93C4-4BCD-93E2-E3B085C9AB24}">
+                <p16:designElem xmlns:p16="http://schemas.microsoft.com/office/powerpoint/2015/main" val="1"/>
+              </p:ext>
+            </p:extLst>
+          </p:nvPr>
+        </p:nvSpPr>
+        <p:spPr>
+          <a:xfrm>
+            <a:off x="2937" y="0"/>
+            <a:ext cx="3867150" cy="6858000"/>
+          </a:xfrm>
+          <a:prstGeom prst="rect">
+            <a:avLst/>
+          </a:prstGeom>
+          <a:solidFill>
+            <a:srgbClr val="FFFFFF"/>
+          </a:solidFill>
+          <a:ln w="12700" cap="flat" cmpd="sng" algn="ctr">
+            <a:noFill/>
+            <a:prstDash val="solid"/>
+            <a:miter lim="800000"/>
+          </a:ln>
+          <a:effectLst/>
+        </p:spPr>
+        <p:style>
+          <a:lnRef idx="2">
+            <a:schemeClr val="accent1">
+              <a:shade val="50000"/>
+            </a:schemeClr>
+          </a:lnRef>
+          <a:fillRef idx="1">
+            <a:schemeClr val="accent1"/>
+          </a:fillRef>
+          <a:effectRef idx="0">
+            <a:schemeClr val="accent1"/>
+          </a:effectRef>
+          <a:fontRef idx="minor">
+            <a:schemeClr val="lt1"/>
+          </a:fontRef>
+        </p:style>
+        <p:txBody>
+          <a:bodyPr rtlCol="0" anchor="ctr"/>
+          <a:lstStyle/>
+          <a:p>
+            <a:pPr algn="ctr"/>
+            <a:endParaRPr lang="en-US">
+              <a:solidFill>
+                <a:schemeClr val="bg1">
+                  <a:alpha val="20000"/>
+                </a:schemeClr>
+              </a:solidFill>
+            </a:endParaRPr>
+          </a:p>
+        </p:txBody>
+      </p:sp>
+      <p:pic>
+        <p:nvPicPr>
+          <p:cNvPr id="7" name="Picture 6" descr="A screenshot of a computer&#10;&#10;Description automatically generated with low confidence">
+            <a:extLst>
+              <a:ext uri="{FF2B5EF4-FFF2-40B4-BE49-F238E27FC236}">
+                <a16:creationId xmlns:a16="http://schemas.microsoft.com/office/drawing/2014/main" id="{89B9CB13-1DF0-F9C9-1460-183CA8F624FD}"/>
+              </a:ext>
+            </a:extLst>
+          </p:cNvPr>
+          <p:cNvPicPr>
+            <a:picLocks noChangeAspect="1"/>
+          </p:cNvPicPr>
+          <p:nvPr/>
+        </p:nvPicPr>
+        <p:blipFill>
+          <a:blip r:embed="rId3">
+            <a:extLst>
+              <a:ext uri="{28A0092B-C50C-407E-A947-70E740481C1C}">
+                <a14:useLocalDpi xmlns:a14="http://schemas.microsoft.com/office/drawing/2010/main" val="0"/>
+              </a:ext>
+            </a:extLst>
+          </a:blip>
+          <a:stretch>
+            <a:fillRect/>
+          </a:stretch>
+        </p:blipFill>
+        <p:spPr>
+          <a:xfrm>
+            <a:off x="540000" y="786040"/>
+            <a:ext cx="2768400" cy="2261985"/>
+          </a:xfrm>
+          <a:prstGeom prst="rect">
+            <a:avLst/>
+          </a:prstGeom>
+        </p:spPr>
+      </p:pic>
+      <p:cxnSp>
+        <p:nvCxnSpPr>
+          <p:cNvPr id="18" name="Straight Connector 17">
+            <a:extLst>
+              <a:ext uri="{FF2B5EF4-FFF2-40B4-BE49-F238E27FC236}">
+                <a16:creationId xmlns:a16="http://schemas.microsoft.com/office/drawing/2014/main" id="{26C7ED5D-77C4-4564-8B1A-E55609CF44C4}"/>
+              </a:ext>
+              <a:ext uri="{C183D7F6-B498-43B3-948B-1728B52AA6E4}">
+                <adec:decorative xmlns:adec="http://schemas.microsoft.com/office/drawing/2017/decorative" val="1"/>
+              </a:ext>
+            </a:extLst>
+          </p:cNvPr>
+          <p:cNvCxnSpPr>
+            <a:cxnSpLocks noGrp="1" noRot="1" noChangeAspect="1" noMove="1" noResize="1" noEditPoints="1" noAdjustHandles="1" noChangeArrowheads="1" noChangeShapeType="1"/>
+          </p:cNvCxnSpPr>
+          <p:nvPr>
+            <p:extLst>
+              <p:ext uri="{386F3935-93C4-4BCD-93E2-E3B085C9AB24}">
+                <p16:designElem xmlns:p16="http://schemas.microsoft.com/office/powerpoint/2015/main" val="1"/>
+              </p:ext>
+            </p:extLst>
+          </p:nvPr>
+        </p:nvCxnSpPr>
+        <p:spPr>
+          <a:xfrm>
+            <a:off x="7757986" y="1964598"/>
+            <a:ext cx="540000" cy="0"/>
+          </a:xfrm>
+          <a:prstGeom prst="line">
+            <a:avLst/>
+          </a:prstGeom>
+          <a:ln w="12700">
+            <a:solidFill>
+              <a:srgbClr val="FFFFFF"/>
+            </a:solidFill>
+          </a:ln>
+        </p:spPr>
+        <p:style>
+          <a:lnRef idx="1">
+            <a:schemeClr val="accent1"/>
+          </a:lnRef>
+          <a:fillRef idx="0">
+            <a:schemeClr val="accent1"/>
+          </a:fillRef>
+          <a:effectRef idx="0">
+            <a:schemeClr val="accent1"/>
+          </a:effectRef>
+          <a:fontRef idx="minor">
+            <a:schemeClr val="tx1"/>
+          </a:fontRef>
+        </p:style>
+      </p:cxnSp>
+      <p:pic>
+        <p:nvPicPr>
+          <p:cNvPr id="9" name="Picture 8" descr="A screenshot of a computer&#10;&#10;Description automatically generated with low confidence">
+            <a:extLst>
+              <a:ext uri="{FF2B5EF4-FFF2-40B4-BE49-F238E27FC236}">
+                <a16:creationId xmlns:a16="http://schemas.microsoft.com/office/drawing/2014/main" id="{203A6737-AEDE-BD4E-B038-7B64B0DB7782}"/>
+              </a:ext>
+            </a:extLst>
+          </p:cNvPr>
+          <p:cNvPicPr>
+            <a:picLocks noChangeAspect="1"/>
+          </p:cNvPicPr>
+          <p:nvPr/>
+        </p:nvPicPr>
+        <p:blipFill>
+          <a:blip r:embed="rId4">
+            <a:extLst>
+              <a:ext uri="{28A0092B-C50C-407E-A947-70E740481C1C}">
+                <a14:useLocalDpi xmlns:a14="http://schemas.microsoft.com/office/drawing/2010/main" val="0"/>
+              </a:ext>
+            </a:extLst>
+          </a:blip>
+          <a:stretch>
+            <a:fillRect/>
+          </a:stretch>
+        </p:blipFill>
+        <p:spPr>
+          <a:xfrm>
+            <a:off x="540000" y="3939368"/>
+            <a:ext cx="2768400" cy="2003263"/>
+          </a:xfrm>
+          <a:prstGeom prst="rect">
+            <a:avLst/>
+          </a:prstGeom>
+        </p:spPr>
+      </p:pic>
+      <p:sp>
+        <p:nvSpPr>
+          <p:cNvPr id="3" name="Content Placeholder 2">
+            <a:extLst>
+              <a:ext uri="{FF2B5EF4-FFF2-40B4-BE49-F238E27FC236}">
+                <a16:creationId xmlns:a16="http://schemas.microsoft.com/office/drawing/2014/main" id="{3C73EBFA-6EEC-873D-72DE-E367F94482A8}"/>
+              </a:ext>
+            </a:extLst>
+          </p:cNvPr>
+          <p:cNvSpPr>
+            <a:spLocks noGrp="1"/>
+          </p:cNvSpPr>
+          <p:nvPr>
+            <p:ph idx="1"/>
+          </p:nvPr>
+        </p:nvSpPr>
+        <p:spPr>
+          <a:xfrm>
+            <a:off x="4868986" y="2413468"/>
+            <a:ext cx="6318000" cy="3365032"/>
+          </a:xfrm>
+        </p:spPr>
+        <p:txBody>
+          <a:bodyPr>
+            <a:normAutofit/>
+          </a:bodyPr>
+          <a:lstStyle/>
+          <a:p>
+            <a:r>
+              <a:rPr lang="en-US" sz="1900" dirty="0"/>
+              <a:t>Go to the </a:t>
+            </a:r>
+            <a:r>
+              <a:rPr lang="en-US" sz="1900" dirty="0">
+                <a:hlinkClick r:id="rId5"/>
+              </a:rPr>
+              <a:t>discord developer portal</a:t>
+            </a:r>
+            <a:r>
+              <a:rPr lang="en-US" sz="1900" dirty="0"/>
+              <a:t> </a:t>
+            </a:r>
+          </a:p>
+          <a:p>
+            <a:r>
+              <a:rPr lang="en-US" sz="1900" dirty="0"/>
+              <a:t>Click “New Application” -&gt; Enter details -&gt; Create</a:t>
+            </a:r>
+          </a:p>
+          <a:p>
+            <a:r>
+              <a:rPr lang="en-US" sz="1900" dirty="0"/>
+              <a:t>Press Bot -&gt; Add Bot -&gt; Reset Token -&gt; Save the token</a:t>
+            </a:r>
+          </a:p>
+          <a:p>
+            <a:r>
+              <a:rPr lang="en-US" sz="1900" dirty="0"/>
+              <a:t>Press OAuth2 -&gt; General -&gt; Copy Client ID -&gt; Save the Client ID</a:t>
+            </a:r>
+          </a:p>
+        </p:txBody>
+      </p:sp>
+      <p:sp>
+        <p:nvSpPr>
+          <p:cNvPr id="10" name="Text Placeholder 3">
+            <a:extLst>
+              <a:ext uri="{FF2B5EF4-FFF2-40B4-BE49-F238E27FC236}">
+                <a16:creationId xmlns:a16="http://schemas.microsoft.com/office/drawing/2014/main" id="{09283B3C-6E0C-3596-217F-AA621DBD727B}"/>
+              </a:ext>
+            </a:extLst>
+          </p:cNvPr>
+          <p:cNvSpPr txBox="1">
+            <a:spLocks/>
+          </p:cNvSpPr>
+          <p:nvPr/>
+        </p:nvSpPr>
+        <p:spPr>
+          <a:xfrm>
+            <a:off x="531177" y="3048025"/>
+            <a:ext cx="2786045" cy="914999"/>
+          </a:xfrm>
+          <a:prstGeom prst="rect">
+            <a:avLst/>
+          </a:prstGeom>
+        </p:spPr>
+        <p:txBody>
+          <a:bodyPr vert="horz" lIns="91440" tIns="45720" rIns="91440" bIns="45720" rtlCol="0">
+            <a:normAutofit/>
+          </a:bodyPr>
+          <a:lstStyle>
+            <a:lvl1pPr marL="0" indent="0" algn="l" defTabSz="914400" rtl="0" eaLnBrk="1" latinLnBrk="0" hangingPunct="1">
+              <a:lnSpc>
+                <a:spcPct val="150000"/>
+              </a:lnSpc>
+              <a:spcBef>
+                <a:spcPts val="1000"/>
+              </a:spcBef>
+              <a:buClr>
+                <a:schemeClr val="accent3"/>
+              </a:buClr>
+              <a:buFont typeface="Wingdings" panose="05000000000000000000" pitchFamily="2" charset="2"/>
+              <a:buNone/>
+              <a:defRPr sz="2000" kern="1200" spc="50">
+                <a:solidFill>
+                  <a:schemeClr val="tx1">
+                    <a:alpha val="60000"/>
+                  </a:schemeClr>
+                </a:solidFill>
+                <a:latin typeface="+mn-lt"/>
+                <a:ea typeface="+mn-ea"/>
+                <a:cs typeface="+mn-cs"/>
+              </a:defRPr>
+            </a:lvl1pPr>
+            <a:lvl2pPr marL="457200" indent="0" algn="l" defTabSz="914400" rtl="0" eaLnBrk="1" latinLnBrk="0" hangingPunct="1">
+              <a:lnSpc>
+                <a:spcPct val="150000"/>
+              </a:lnSpc>
+              <a:spcBef>
+                <a:spcPts val="500"/>
+              </a:spcBef>
+              <a:buFontTx/>
+              <a:buNone/>
+              <a:defRPr sz="1400" b="0" i="1" kern="1200" spc="50" baseline="0">
+                <a:solidFill>
+                  <a:schemeClr val="tx1">
+                    <a:alpha val="60000"/>
+                  </a:schemeClr>
+                </a:solidFill>
+                <a:latin typeface="+mn-lt"/>
+                <a:ea typeface="+mn-ea"/>
+                <a:cs typeface="+mn-cs"/>
+              </a:defRPr>
+            </a:lvl2pPr>
+            <a:lvl3pPr marL="914400" indent="0" algn="l" defTabSz="914400" rtl="0" eaLnBrk="1" latinLnBrk="0" hangingPunct="1">
+              <a:lnSpc>
+                <a:spcPct val="150000"/>
+              </a:lnSpc>
+              <a:spcBef>
+                <a:spcPts val="500"/>
+              </a:spcBef>
+              <a:buClr>
+                <a:schemeClr val="accent3"/>
+              </a:buClr>
+              <a:buFont typeface="Wingdings" panose="05000000000000000000" pitchFamily="2" charset="2"/>
+              <a:buNone/>
+              <a:defRPr sz="1200" kern="1200" spc="50">
+                <a:solidFill>
+                  <a:schemeClr val="tx1">
+                    <a:alpha val="60000"/>
+                  </a:schemeClr>
+                </a:solidFill>
+                <a:latin typeface="+mn-lt"/>
+                <a:ea typeface="+mn-ea"/>
+                <a:cs typeface="+mn-cs"/>
+              </a:defRPr>
+            </a:lvl3pPr>
+            <a:lvl4pPr marL="1371600" indent="0" algn="l" defTabSz="914400" rtl="0" eaLnBrk="1" latinLnBrk="0" hangingPunct="1">
+              <a:lnSpc>
+                <a:spcPct val="150000"/>
+              </a:lnSpc>
+              <a:spcBef>
+                <a:spcPts val="500"/>
+              </a:spcBef>
+              <a:buClr>
+                <a:schemeClr val="accent3"/>
+              </a:buClr>
+              <a:buFontTx/>
+              <a:buNone/>
+              <a:defRPr sz="1000" b="0" i="1" kern="1200" spc="50" baseline="0">
+                <a:solidFill>
+                  <a:schemeClr val="tx1">
+                    <a:alpha val="60000"/>
+                  </a:schemeClr>
+                </a:solidFill>
+                <a:latin typeface="+mn-lt"/>
+                <a:ea typeface="+mn-ea"/>
+                <a:cs typeface="+mn-cs"/>
+              </a:defRPr>
+            </a:lvl4pPr>
+            <a:lvl5pPr marL="1828800" indent="0" algn="l" defTabSz="914400" rtl="0" eaLnBrk="1" latinLnBrk="0" hangingPunct="1">
+              <a:lnSpc>
+                <a:spcPct val="150000"/>
+              </a:lnSpc>
+              <a:spcBef>
+                <a:spcPts val="500"/>
+              </a:spcBef>
+              <a:buClr>
+                <a:schemeClr val="accent3"/>
+              </a:buClr>
+              <a:buFont typeface="Wingdings" panose="05000000000000000000" pitchFamily="2" charset="2"/>
+              <a:buNone/>
+              <a:defRPr sz="1000" kern="1200" spc="50">
+                <a:solidFill>
+                  <a:schemeClr val="tx1">
+                    <a:alpha val="60000"/>
+                  </a:schemeClr>
+                </a:solidFill>
+                <a:latin typeface="+mn-lt"/>
+                <a:ea typeface="+mn-ea"/>
+                <a:cs typeface="+mn-cs"/>
+              </a:defRPr>
+            </a:lvl5pPr>
+            <a:lvl6pPr marL="2286000" indent="0" algn="l" defTabSz="914400" rtl="0" eaLnBrk="1" latinLnBrk="0" hangingPunct="1">
+              <a:lnSpc>
+                <a:spcPct val="90000"/>
+              </a:lnSpc>
+              <a:spcBef>
+                <a:spcPts val="500"/>
+              </a:spcBef>
+              <a:buFont typeface="Arial" panose="020B0604020202020204" pitchFamily="34" charset="0"/>
+              <a:buNone/>
+              <a:defRPr sz="1000" kern="1200">
+                <a:solidFill>
+                  <a:schemeClr val="tx1"/>
+                </a:solidFill>
+                <a:latin typeface="+mn-lt"/>
+                <a:ea typeface="+mn-ea"/>
+                <a:cs typeface="+mn-cs"/>
+              </a:defRPr>
+            </a:lvl6pPr>
+            <a:lvl7pPr marL="2743200" indent="0" algn="l" defTabSz="914400" rtl="0" eaLnBrk="1" latinLnBrk="0" hangingPunct="1">
+              <a:lnSpc>
+                <a:spcPct val="90000"/>
+              </a:lnSpc>
+              <a:spcBef>
+                <a:spcPts val="500"/>
+              </a:spcBef>
+              <a:buFont typeface="Arial" panose="020B0604020202020204" pitchFamily="34" charset="0"/>
+              <a:buNone/>
+              <a:defRPr sz="1000" kern="1200">
+                <a:solidFill>
+                  <a:schemeClr val="tx1"/>
+                </a:solidFill>
+                <a:latin typeface="+mn-lt"/>
+                <a:ea typeface="+mn-ea"/>
+                <a:cs typeface="+mn-cs"/>
+              </a:defRPr>
+            </a:lvl7pPr>
+            <a:lvl8pPr marL="3200400" indent="0" algn="l" defTabSz="914400" rtl="0" eaLnBrk="1" latinLnBrk="0" hangingPunct="1">
+              <a:lnSpc>
+                <a:spcPct val="90000"/>
+              </a:lnSpc>
+              <a:spcBef>
+                <a:spcPts val="500"/>
+              </a:spcBef>
+              <a:buFont typeface="Arial" panose="020B0604020202020204" pitchFamily="34" charset="0"/>
+              <a:buNone/>
+              <a:defRPr sz="1000" kern="1200">
+                <a:solidFill>
+                  <a:schemeClr val="tx1"/>
+                </a:solidFill>
+                <a:latin typeface="+mn-lt"/>
+                <a:ea typeface="+mn-ea"/>
+                <a:cs typeface="+mn-cs"/>
+              </a:defRPr>
+            </a:lvl8pPr>
+            <a:lvl9pPr marL="3657600" indent="0" algn="l" defTabSz="914400" rtl="0" eaLnBrk="1" latinLnBrk="0" hangingPunct="1">
+              <a:lnSpc>
+                <a:spcPct val="90000"/>
+              </a:lnSpc>
+              <a:spcBef>
+                <a:spcPts val="500"/>
+              </a:spcBef>
+              <a:buFont typeface="Arial" panose="020B0604020202020204" pitchFamily="34" charset="0"/>
+              <a:buNone/>
+              <a:defRPr sz="1000" kern="1200">
+                <a:solidFill>
+                  <a:schemeClr val="tx1"/>
+                </a:solidFill>
+                <a:latin typeface="+mn-lt"/>
+                <a:ea typeface="+mn-ea"/>
+                <a:cs typeface="+mn-cs"/>
+              </a:defRPr>
+            </a:lvl9pPr>
+          </a:lstStyle>
+          <a:p>
+            <a:pPr>
+              <a:lnSpc>
+                <a:spcPct val="140000"/>
+              </a:lnSpc>
+            </a:pPr>
+            <a:r>
+              <a:rPr lang="en-US" sz="1400" dirty="0"/>
+              <a:t>Fig. 3: Token screenshot.</a:t>
+            </a:r>
+          </a:p>
+        </p:txBody>
+      </p:sp>
+      <p:sp>
+        <p:nvSpPr>
+          <p:cNvPr id="11" name="Text Placeholder 3">
+            <a:extLst>
+              <a:ext uri="{FF2B5EF4-FFF2-40B4-BE49-F238E27FC236}">
+                <a16:creationId xmlns:a16="http://schemas.microsoft.com/office/drawing/2014/main" id="{BE9C9296-1DA6-4B12-9F80-20979B937F15}"/>
+              </a:ext>
+            </a:extLst>
+          </p:cNvPr>
+          <p:cNvSpPr txBox="1">
+            <a:spLocks/>
+          </p:cNvSpPr>
+          <p:nvPr/>
+        </p:nvSpPr>
+        <p:spPr>
+          <a:xfrm>
+            <a:off x="543489" y="5943001"/>
+            <a:ext cx="2786045" cy="914999"/>
+          </a:xfrm>
+          <a:prstGeom prst="rect">
+            <a:avLst/>
+          </a:prstGeom>
+        </p:spPr>
+        <p:txBody>
+          <a:bodyPr vert="horz" lIns="91440" tIns="45720" rIns="91440" bIns="45720" rtlCol="0">
+            <a:normAutofit/>
+          </a:bodyPr>
+          <a:lstStyle>
+            <a:lvl1pPr marL="0" indent="0" algn="l" defTabSz="914400" rtl="0" eaLnBrk="1" latinLnBrk="0" hangingPunct="1">
+              <a:lnSpc>
+                <a:spcPct val="150000"/>
+              </a:lnSpc>
+              <a:spcBef>
+                <a:spcPts val="1000"/>
+              </a:spcBef>
+              <a:buClr>
+                <a:schemeClr val="accent3"/>
+              </a:buClr>
+              <a:buFont typeface="Wingdings" panose="05000000000000000000" pitchFamily="2" charset="2"/>
+              <a:buNone/>
+              <a:defRPr sz="2000" kern="1200" spc="50">
+                <a:solidFill>
+                  <a:schemeClr val="tx1">
+                    <a:alpha val="60000"/>
+                  </a:schemeClr>
+                </a:solidFill>
+                <a:latin typeface="+mn-lt"/>
+                <a:ea typeface="+mn-ea"/>
+                <a:cs typeface="+mn-cs"/>
+              </a:defRPr>
+            </a:lvl1pPr>
+            <a:lvl2pPr marL="457200" indent="0" algn="l" defTabSz="914400" rtl="0" eaLnBrk="1" latinLnBrk="0" hangingPunct="1">
+              <a:lnSpc>
+                <a:spcPct val="150000"/>
+              </a:lnSpc>
+              <a:spcBef>
+                <a:spcPts val="500"/>
+              </a:spcBef>
+              <a:buFontTx/>
+              <a:buNone/>
+              <a:defRPr sz="1400" b="0" i="1" kern="1200" spc="50" baseline="0">
+                <a:solidFill>
+                  <a:schemeClr val="tx1">
+                    <a:alpha val="60000"/>
+                  </a:schemeClr>
+                </a:solidFill>
+                <a:latin typeface="+mn-lt"/>
+                <a:ea typeface="+mn-ea"/>
+                <a:cs typeface="+mn-cs"/>
+              </a:defRPr>
+            </a:lvl2pPr>
+            <a:lvl3pPr marL="914400" indent="0" algn="l" defTabSz="914400" rtl="0" eaLnBrk="1" latinLnBrk="0" hangingPunct="1">
+              <a:lnSpc>
+                <a:spcPct val="150000"/>
+              </a:lnSpc>
+              <a:spcBef>
+                <a:spcPts val="500"/>
+              </a:spcBef>
+              <a:buClr>
+                <a:schemeClr val="accent3"/>
+              </a:buClr>
+              <a:buFont typeface="Wingdings" panose="05000000000000000000" pitchFamily="2" charset="2"/>
+              <a:buNone/>
+              <a:defRPr sz="1200" kern="1200" spc="50">
+                <a:solidFill>
+                  <a:schemeClr val="tx1">
+                    <a:alpha val="60000"/>
+                  </a:schemeClr>
+                </a:solidFill>
+                <a:latin typeface="+mn-lt"/>
+                <a:ea typeface="+mn-ea"/>
+                <a:cs typeface="+mn-cs"/>
+              </a:defRPr>
+            </a:lvl3pPr>
+            <a:lvl4pPr marL="1371600" indent="0" algn="l" defTabSz="914400" rtl="0" eaLnBrk="1" latinLnBrk="0" hangingPunct="1">
+              <a:lnSpc>
+                <a:spcPct val="150000"/>
+              </a:lnSpc>
+              <a:spcBef>
+                <a:spcPts val="500"/>
+              </a:spcBef>
+              <a:buClr>
+                <a:schemeClr val="accent3"/>
+              </a:buClr>
+              <a:buFontTx/>
+              <a:buNone/>
+              <a:defRPr sz="1000" b="0" i="1" kern="1200" spc="50" baseline="0">
+                <a:solidFill>
+                  <a:schemeClr val="tx1">
+                    <a:alpha val="60000"/>
+                  </a:schemeClr>
+                </a:solidFill>
+                <a:latin typeface="+mn-lt"/>
+                <a:ea typeface="+mn-ea"/>
+                <a:cs typeface="+mn-cs"/>
+              </a:defRPr>
+            </a:lvl4pPr>
+            <a:lvl5pPr marL="1828800" indent="0" algn="l" defTabSz="914400" rtl="0" eaLnBrk="1" latinLnBrk="0" hangingPunct="1">
+              <a:lnSpc>
+                <a:spcPct val="150000"/>
+              </a:lnSpc>
+              <a:spcBef>
+                <a:spcPts val="500"/>
+              </a:spcBef>
+              <a:buClr>
+                <a:schemeClr val="accent3"/>
+              </a:buClr>
+              <a:buFont typeface="Wingdings" panose="05000000000000000000" pitchFamily="2" charset="2"/>
+              <a:buNone/>
+              <a:defRPr sz="1000" kern="1200" spc="50">
+                <a:solidFill>
+                  <a:schemeClr val="tx1">
+                    <a:alpha val="60000"/>
+                  </a:schemeClr>
+                </a:solidFill>
+                <a:latin typeface="+mn-lt"/>
+                <a:ea typeface="+mn-ea"/>
+                <a:cs typeface="+mn-cs"/>
+              </a:defRPr>
+            </a:lvl5pPr>
+            <a:lvl6pPr marL="2286000" indent="0" algn="l" defTabSz="914400" rtl="0" eaLnBrk="1" latinLnBrk="0" hangingPunct="1">
+              <a:lnSpc>
+                <a:spcPct val="90000"/>
+              </a:lnSpc>
+              <a:spcBef>
+                <a:spcPts val="500"/>
+              </a:spcBef>
+              <a:buFont typeface="Arial" panose="020B0604020202020204" pitchFamily="34" charset="0"/>
+              <a:buNone/>
+              <a:defRPr sz="1000" kern="1200">
+                <a:solidFill>
+                  <a:schemeClr val="tx1"/>
+                </a:solidFill>
+                <a:latin typeface="+mn-lt"/>
+                <a:ea typeface="+mn-ea"/>
+                <a:cs typeface="+mn-cs"/>
+              </a:defRPr>
+            </a:lvl6pPr>
+            <a:lvl7pPr marL="2743200" indent="0" algn="l" defTabSz="914400" rtl="0" eaLnBrk="1" latinLnBrk="0" hangingPunct="1">
+              <a:lnSpc>
+                <a:spcPct val="90000"/>
+              </a:lnSpc>
+              <a:spcBef>
+                <a:spcPts val="500"/>
+              </a:spcBef>
+              <a:buFont typeface="Arial" panose="020B0604020202020204" pitchFamily="34" charset="0"/>
+              <a:buNone/>
+              <a:defRPr sz="1000" kern="1200">
+                <a:solidFill>
+                  <a:schemeClr val="tx1"/>
+                </a:solidFill>
+                <a:latin typeface="+mn-lt"/>
+                <a:ea typeface="+mn-ea"/>
+                <a:cs typeface="+mn-cs"/>
+              </a:defRPr>
+            </a:lvl7pPr>
+            <a:lvl8pPr marL="3200400" indent="0" algn="l" defTabSz="914400" rtl="0" eaLnBrk="1" latinLnBrk="0" hangingPunct="1">
+              <a:lnSpc>
+                <a:spcPct val="90000"/>
+              </a:lnSpc>
+              <a:spcBef>
+                <a:spcPts val="500"/>
+              </a:spcBef>
+              <a:buFont typeface="Arial" panose="020B0604020202020204" pitchFamily="34" charset="0"/>
+              <a:buNone/>
+              <a:defRPr sz="1000" kern="1200">
+                <a:solidFill>
+                  <a:schemeClr val="tx1"/>
+                </a:solidFill>
+                <a:latin typeface="+mn-lt"/>
+                <a:ea typeface="+mn-ea"/>
+                <a:cs typeface="+mn-cs"/>
+              </a:defRPr>
+            </a:lvl8pPr>
+            <a:lvl9pPr marL="3657600" indent="0" algn="l" defTabSz="914400" rtl="0" eaLnBrk="1" latinLnBrk="0" hangingPunct="1">
+              <a:lnSpc>
+                <a:spcPct val="90000"/>
+              </a:lnSpc>
+              <a:spcBef>
+                <a:spcPts val="500"/>
+              </a:spcBef>
+              <a:buFont typeface="Arial" panose="020B0604020202020204" pitchFamily="34" charset="0"/>
+              <a:buNone/>
+              <a:defRPr sz="1000" kern="1200">
+                <a:solidFill>
+                  <a:schemeClr val="tx1"/>
+                </a:solidFill>
+                <a:latin typeface="+mn-lt"/>
+                <a:ea typeface="+mn-ea"/>
+                <a:cs typeface="+mn-cs"/>
+              </a:defRPr>
+            </a:lvl9pPr>
+          </a:lstStyle>
+          <a:p>
+            <a:pPr>
+              <a:lnSpc>
+                <a:spcPct val="140000"/>
+              </a:lnSpc>
+            </a:pPr>
+            <a:r>
+              <a:rPr lang="en-US" sz="1400" dirty="0"/>
+              <a:t>Fig. 4: Client ID screenshot.</a:t>
+            </a:r>
+          </a:p>
+        </p:txBody>
+      </p:sp>
+    </p:spTree>
+    <p:extLst>
+      <p:ext uri="{BB962C8B-B14F-4D97-AF65-F5344CB8AC3E}">
+        <p14:creationId xmlns:p14="http://schemas.microsoft.com/office/powerpoint/2010/main" val="1653742543"/>
+      </p:ext>
+    </p:extLst>
+  </p:cSld>
+  <p:clrMapOvr>
+    <a:masterClrMapping/>
+  </p:clrMapOvr>
+</p:sld>
+</file>
+
+<file path=ppt/slides/slide5.xml><?xml version="1.0" encoding="utf-8"?>
+<p:sld xmlns:a="http://schemas.openxmlformats.org/drawingml/2006/main" xmlns:r="http://schemas.openxmlformats.org/officeDocument/2006/relationships" xmlns:p="http://schemas.openxmlformats.org/presentationml/2006/main">
+  <p:cSld>
+    <p:bg>
+      <p:bgPr>
+        <a:solidFill>
+          <a:schemeClr val="bg2"/>
+        </a:solidFill>
+        <a:effectLst/>
+      </p:bgPr>
+    </p:bg>
+    <p:spTree>
+      <p:nvGrpSpPr>
+        <p:cNvPr id="1" name=""/>
+        <p:cNvGrpSpPr/>
+        <p:nvPr/>
+      </p:nvGrpSpPr>
+      <p:grpSpPr>
+        <a:xfrm>
+          <a:off x="0" y="0"/>
+          <a:ext cx="0" cy="0"/>
+          <a:chOff x="0" y="0"/>
+          <a:chExt cx="0" cy="0"/>
+        </a:xfrm>
+      </p:grpSpPr>
+      <p:sp useBgFill="1">
+        <p:nvSpPr>
+          <p:cNvPr id="10" name="Rectangle 9">
+            <a:extLst>
+              <a:ext uri="{FF2B5EF4-FFF2-40B4-BE49-F238E27FC236}">
+                <a16:creationId xmlns:a16="http://schemas.microsoft.com/office/drawing/2014/main" id="{DB66C9CD-6BF4-44CA-8078-0BB819080761}"/>
+              </a:ext>
+              <a:ext uri="{C183D7F6-B498-43B3-948B-1728B52AA6E4}">
+                <adec:decorative xmlns:adec="http://schemas.microsoft.com/office/drawing/2017/decorative" val="1"/>
+              </a:ext>
+            </a:extLst>
+          </p:cNvPr>
+          <p:cNvSpPr>
+            <a:spLocks noGrp="1" noRot="1" noChangeAspect="1" noMove="1" noResize="1" noEditPoints="1" noAdjustHandles="1" noChangeArrowheads="1" noChangeShapeType="1" noTextEdit="1"/>
+          </p:cNvSpPr>
+          <p:nvPr>
+            <p:extLst>
+              <p:ext uri="{386F3935-93C4-4BCD-93E2-E3B085C9AB24}">
+                <p16:designElem xmlns:p16="http://schemas.microsoft.com/office/powerpoint/2015/main" val="1"/>
+              </p:ext>
+            </p:extLst>
+          </p:nvPr>
+        </p:nvSpPr>
+        <p:spPr>
+          <a:xfrm>
+            <a:off x="0" y="0"/>
+            <a:ext cx="12192000" cy="6858000"/>
+          </a:xfrm>
+          <a:prstGeom prst="rect">
+            <a:avLst/>
+          </a:prstGeom>
+          <a:ln w="12700" cap="flat" cmpd="sng" algn="ctr">
+            <a:noFill/>
+            <a:prstDash val="solid"/>
+            <a:miter lim="800000"/>
+          </a:ln>
+          <a:effectLst/>
+          <a:extLst>
+            <a:ext uri="{91240B29-F687-4F45-9708-019B960494DF}">
+              <a14:hiddenLine xmlns:a14="http://schemas.microsoft.com/office/drawing/2010/main" w="12700" cap="flat" cmpd="sng" algn="ctr">
+                <a:solidFill>
+                  <a:schemeClr val="accent1">
+                    <a:shade val="50000"/>
+                  </a:schemeClr>
+                </a:solidFill>
+                <a:prstDash val="solid"/>
+                <a:miter lim="800000"/>
+              </a14:hiddenLine>
+            </a:ext>
+          </a:extLst>
+        </p:spPr>
+        <p:style>
+          <a:lnRef idx="2">
+            <a:schemeClr val="accent1">
+              <a:shade val="50000"/>
+            </a:schemeClr>
+          </a:lnRef>
+          <a:fillRef idx="1">
+            <a:schemeClr val="accent1"/>
+          </a:fillRef>
+          <a:effectRef idx="0">
+            <a:schemeClr val="accent1"/>
+          </a:effectRef>
+          <a:fontRef idx="minor">
+            <a:schemeClr val="lt1"/>
+          </a:fontRef>
+        </p:style>
+        <p:txBody>
+          <a:bodyPr rtlCol="0" anchor="ctr"/>
+          <a:lstStyle/>
+          <a:p>
+            <a:pPr algn="ctr"/>
+            <a:endParaRPr lang="en-US"/>
+          </a:p>
+        </p:txBody>
+      </p:sp>
+      <p:sp>
+        <p:nvSpPr>
+          <p:cNvPr id="2" name="Title 1">
+            <a:extLst>
+              <a:ext uri="{FF2B5EF4-FFF2-40B4-BE49-F238E27FC236}">
                 <a16:creationId xmlns:a16="http://schemas.microsoft.com/office/drawing/2014/main" id="{AE61743A-92D4-AC11-12F8-6CA818E7E6B9}"/>
               </a:ext>
             </a:extLst>
@@ -6392,7 +7749,7 @@
 </p:sld>
 </file>
 
-<file path=ppt/slides/slide5.xml><?xml version="1.0" encoding="utf-8"?>
+<file path=ppt/slides/slide6.xml><?xml version="1.0" encoding="utf-8"?>
 <p:sld xmlns:a="http://schemas.openxmlformats.org/drawingml/2006/main" xmlns:r="http://schemas.openxmlformats.org/officeDocument/2006/relationships" xmlns:p="http://schemas.openxmlformats.org/presentationml/2006/main">
   <p:cSld>
     <p:spTree>
@@ -6460,10 +7817,27 @@
           </a:bodyPr>
           <a:lstStyle/>
           <a:p>
+            <a:pPr>
+              <a:buFont typeface="+mj-lt"/>
+              <a:buAutoNum type="arabicPeriod"/>
+            </a:pPr>
             <a:r>
               <a:rPr lang="en-US" sz="1600" dirty="0"/>
               <a:t>Fig. 1: Santosa, William. “Active Developer badge screenshot.” Online, 16 Jan. 2023. Accessed 16 Jan. 2023.</a:t>
             </a:r>
+          </a:p>
+          <a:p>
+            <a:pPr>
+              <a:buFont typeface="+mj-lt"/>
+              <a:buAutoNum type="arabicPeriod"/>
+            </a:pPr>
+            <a:r>
+              <a:rPr lang="en-US" sz="1600" dirty="0"/>
+              <a:t>Fig. 2: Santosa, William. “Directory after running commands screenshot.” Online, 16 Jan. 2023. Accessed 16 Jan. 2023.</a:t>
+            </a:r>
+          </a:p>
+          <a:p>
+            <a:endParaRPr lang="en-US" sz="1600" dirty="0"/>
           </a:p>
         </p:txBody>
       </p:sp>

</xml_diff>

<commit_message>
updated presentation slides. will add comments later
</commit_message>
<xml_diff>
--- a/presentation.pptx
+++ b/presentation.pptx
@@ -16384,6 +16384,684 @@
           </a:prstGeom>
         </p:spPr>
       </p:pic>
+      <p:sp>
+        <p:nvSpPr>
+          <p:cNvPr id="3" name="Text Placeholder 3">
+            <a:extLst>
+              <a:ext uri="{FF2B5EF4-FFF2-40B4-BE49-F238E27FC236}">
+                <a16:creationId xmlns:a16="http://schemas.microsoft.com/office/drawing/2014/main" id="{DC6F8DC5-9619-63B1-CF08-40E68DC271B6}"/>
+              </a:ext>
+            </a:extLst>
+          </p:cNvPr>
+          <p:cNvSpPr txBox="1">
+            <a:spLocks/>
+          </p:cNvSpPr>
+          <p:nvPr/>
+        </p:nvSpPr>
+        <p:spPr>
+          <a:xfrm>
+            <a:off x="988071" y="2281574"/>
+            <a:ext cx="2820358" cy="343513"/>
+          </a:xfrm>
+          <a:prstGeom prst="rect">
+            <a:avLst/>
+          </a:prstGeom>
+        </p:spPr>
+        <p:txBody>
+          <a:bodyPr vert="horz" lIns="91440" tIns="45720" rIns="91440" bIns="45720" rtlCol="0">
+            <a:normAutofit lnSpcReduction="10000"/>
+          </a:bodyPr>
+          <a:lstStyle>
+            <a:lvl1pPr marL="0" indent="0" algn="l" defTabSz="914400" rtl="0" eaLnBrk="1" latinLnBrk="0" hangingPunct="1">
+              <a:lnSpc>
+                <a:spcPct val="150000"/>
+              </a:lnSpc>
+              <a:spcBef>
+                <a:spcPts val="1000"/>
+              </a:spcBef>
+              <a:buClr>
+                <a:schemeClr val="accent3"/>
+              </a:buClr>
+              <a:buFont typeface="Wingdings" panose="05000000000000000000" pitchFamily="2" charset="2"/>
+              <a:buNone/>
+              <a:defRPr sz="2000" kern="1200" spc="50">
+                <a:solidFill>
+                  <a:schemeClr val="tx1">
+                    <a:alpha val="60000"/>
+                  </a:schemeClr>
+                </a:solidFill>
+                <a:latin typeface="+mn-lt"/>
+                <a:ea typeface="+mn-ea"/>
+                <a:cs typeface="+mn-cs"/>
+              </a:defRPr>
+            </a:lvl1pPr>
+            <a:lvl2pPr marL="457200" indent="0" algn="l" defTabSz="914400" rtl="0" eaLnBrk="1" latinLnBrk="0" hangingPunct="1">
+              <a:lnSpc>
+                <a:spcPct val="150000"/>
+              </a:lnSpc>
+              <a:spcBef>
+                <a:spcPts val="500"/>
+              </a:spcBef>
+              <a:buFontTx/>
+              <a:buNone/>
+              <a:defRPr sz="1400" b="0" i="1" kern="1200" spc="50" baseline="0">
+                <a:solidFill>
+                  <a:schemeClr val="tx1">
+                    <a:alpha val="60000"/>
+                  </a:schemeClr>
+                </a:solidFill>
+                <a:latin typeface="+mn-lt"/>
+                <a:ea typeface="+mn-ea"/>
+                <a:cs typeface="+mn-cs"/>
+              </a:defRPr>
+            </a:lvl2pPr>
+            <a:lvl3pPr marL="914400" indent="0" algn="l" defTabSz="914400" rtl="0" eaLnBrk="1" latinLnBrk="0" hangingPunct="1">
+              <a:lnSpc>
+                <a:spcPct val="150000"/>
+              </a:lnSpc>
+              <a:spcBef>
+                <a:spcPts val="500"/>
+              </a:spcBef>
+              <a:buClr>
+                <a:schemeClr val="accent3"/>
+              </a:buClr>
+              <a:buFont typeface="Wingdings" panose="05000000000000000000" pitchFamily="2" charset="2"/>
+              <a:buNone/>
+              <a:defRPr sz="1200" kern="1200" spc="50">
+                <a:solidFill>
+                  <a:schemeClr val="tx1">
+                    <a:alpha val="60000"/>
+                  </a:schemeClr>
+                </a:solidFill>
+                <a:latin typeface="+mn-lt"/>
+                <a:ea typeface="+mn-ea"/>
+                <a:cs typeface="+mn-cs"/>
+              </a:defRPr>
+            </a:lvl3pPr>
+            <a:lvl4pPr marL="1371600" indent="0" algn="l" defTabSz="914400" rtl="0" eaLnBrk="1" latinLnBrk="0" hangingPunct="1">
+              <a:lnSpc>
+                <a:spcPct val="150000"/>
+              </a:lnSpc>
+              <a:spcBef>
+                <a:spcPts val="500"/>
+              </a:spcBef>
+              <a:buClr>
+                <a:schemeClr val="accent3"/>
+              </a:buClr>
+              <a:buFontTx/>
+              <a:buNone/>
+              <a:defRPr sz="1000" b="0" i="1" kern="1200" spc="50" baseline="0">
+                <a:solidFill>
+                  <a:schemeClr val="tx1">
+                    <a:alpha val="60000"/>
+                  </a:schemeClr>
+                </a:solidFill>
+                <a:latin typeface="+mn-lt"/>
+                <a:ea typeface="+mn-ea"/>
+                <a:cs typeface="+mn-cs"/>
+              </a:defRPr>
+            </a:lvl4pPr>
+            <a:lvl5pPr marL="1828800" indent="0" algn="l" defTabSz="914400" rtl="0" eaLnBrk="1" latinLnBrk="0" hangingPunct="1">
+              <a:lnSpc>
+                <a:spcPct val="150000"/>
+              </a:lnSpc>
+              <a:spcBef>
+                <a:spcPts val="500"/>
+              </a:spcBef>
+              <a:buClr>
+                <a:schemeClr val="accent3"/>
+              </a:buClr>
+              <a:buFont typeface="Wingdings" panose="05000000000000000000" pitchFamily="2" charset="2"/>
+              <a:buNone/>
+              <a:defRPr sz="1000" kern="1200" spc="50">
+                <a:solidFill>
+                  <a:schemeClr val="tx1">
+                    <a:alpha val="60000"/>
+                  </a:schemeClr>
+                </a:solidFill>
+                <a:latin typeface="+mn-lt"/>
+                <a:ea typeface="+mn-ea"/>
+                <a:cs typeface="+mn-cs"/>
+              </a:defRPr>
+            </a:lvl5pPr>
+            <a:lvl6pPr marL="2286000" indent="0" algn="l" defTabSz="914400" rtl="0" eaLnBrk="1" latinLnBrk="0" hangingPunct="1">
+              <a:lnSpc>
+                <a:spcPct val="90000"/>
+              </a:lnSpc>
+              <a:spcBef>
+                <a:spcPts val="500"/>
+              </a:spcBef>
+              <a:buFont typeface="Arial" panose="020B0604020202020204" pitchFamily="34" charset="0"/>
+              <a:buNone/>
+              <a:defRPr sz="1000" kern="1200">
+                <a:solidFill>
+                  <a:schemeClr val="tx1"/>
+                </a:solidFill>
+                <a:latin typeface="+mn-lt"/>
+                <a:ea typeface="+mn-ea"/>
+                <a:cs typeface="+mn-cs"/>
+              </a:defRPr>
+            </a:lvl6pPr>
+            <a:lvl7pPr marL="2743200" indent="0" algn="l" defTabSz="914400" rtl="0" eaLnBrk="1" latinLnBrk="0" hangingPunct="1">
+              <a:lnSpc>
+                <a:spcPct val="90000"/>
+              </a:lnSpc>
+              <a:spcBef>
+                <a:spcPts val="500"/>
+              </a:spcBef>
+              <a:buFont typeface="Arial" panose="020B0604020202020204" pitchFamily="34" charset="0"/>
+              <a:buNone/>
+              <a:defRPr sz="1000" kern="1200">
+                <a:solidFill>
+                  <a:schemeClr val="tx1"/>
+                </a:solidFill>
+                <a:latin typeface="+mn-lt"/>
+                <a:ea typeface="+mn-ea"/>
+                <a:cs typeface="+mn-cs"/>
+              </a:defRPr>
+            </a:lvl7pPr>
+            <a:lvl8pPr marL="3200400" indent="0" algn="l" defTabSz="914400" rtl="0" eaLnBrk="1" latinLnBrk="0" hangingPunct="1">
+              <a:lnSpc>
+                <a:spcPct val="90000"/>
+              </a:lnSpc>
+              <a:spcBef>
+                <a:spcPts val="500"/>
+              </a:spcBef>
+              <a:buFont typeface="Arial" panose="020B0604020202020204" pitchFamily="34" charset="0"/>
+              <a:buNone/>
+              <a:defRPr sz="1000" kern="1200">
+                <a:solidFill>
+                  <a:schemeClr val="tx1"/>
+                </a:solidFill>
+                <a:latin typeface="+mn-lt"/>
+                <a:ea typeface="+mn-ea"/>
+                <a:cs typeface="+mn-cs"/>
+              </a:defRPr>
+            </a:lvl8pPr>
+            <a:lvl9pPr marL="3657600" indent="0" algn="l" defTabSz="914400" rtl="0" eaLnBrk="1" latinLnBrk="0" hangingPunct="1">
+              <a:lnSpc>
+                <a:spcPct val="90000"/>
+              </a:lnSpc>
+              <a:spcBef>
+                <a:spcPts val="500"/>
+              </a:spcBef>
+              <a:buFont typeface="Arial" panose="020B0604020202020204" pitchFamily="34" charset="0"/>
+              <a:buNone/>
+              <a:defRPr sz="1000" kern="1200">
+                <a:solidFill>
+                  <a:schemeClr val="tx1"/>
+                </a:solidFill>
+                <a:latin typeface="+mn-lt"/>
+                <a:ea typeface="+mn-ea"/>
+                <a:cs typeface="+mn-cs"/>
+              </a:defRPr>
+            </a:lvl9pPr>
+          </a:lstStyle>
+          <a:p>
+            <a:pPr>
+              <a:lnSpc>
+                <a:spcPct val="140000"/>
+              </a:lnSpc>
+            </a:pPr>
+            <a:r>
+              <a:rPr lang="en-US" sz="1400" dirty="0"/>
+              <a:t>Fig. 10: Command prompt.</a:t>
+            </a:r>
+          </a:p>
+        </p:txBody>
+      </p:sp>
+      <p:sp>
+        <p:nvSpPr>
+          <p:cNvPr id="4" name="Text Placeholder 3">
+            <a:extLst>
+              <a:ext uri="{FF2B5EF4-FFF2-40B4-BE49-F238E27FC236}">
+                <a16:creationId xmlns:a16="http://schemas.microsoft.com/office/drawing/2014/main" id="{D6BB2966-ECC6-FFF2-D69C-CE87597A9A09}"/>
+              </a:ext>
+            </a:extLst>
+          </p:cNvPr>
+          <p:cNvSpPr txBox="1">
+            <a:spLocks/>
+          </p:cNvSpPr>
+          <p:nvPr/>
+        </p:nvSpPr>
+        <p:spPr>
+          <a:xfrm>
+            <a:off x="988071" y="4226998"/>
+            <a:ext cx="2820358" cy="343513"/>
+          </a:xfrm>
+          <a:prstGeom prst="rect">
+            <a:avLst/>
+          </a:prstGeom>
+        </p:spPr>
+        <p:txBody>
+          <a:bodyPr vert="horz" lIns="91440" tIns="45720" rIns="91440" bIns="45720" rtlCol="0">
+            <a:normAutofit lnSpcReduction="10000"/>
+          </a:bodyPr>
+          <a:lstStyle>
+            <a:lvl1pPr marL="0" indent="0" algn="l" defTabSz="914400" rtl="0" eaLnBrk="1" latinLnBrk="0" hangingPunct="1">
+              <a:lnSpc>
+                <a:spcPct val="150000"/>
+              </a:lnSpc>
+              <a:spcBef>
+                <a:spcPts val="1000"/>
+              </a:spcBef>
+              <a:buClr>
+                <a:schemeClr val="accent3"/>
+              </a:buClr>
+              <a:buFont typeface="Wingdings" panose="05000000000000000000" pitchFamily="2" charset="2"/>
+              <a:buNone/>
+              <a:defRPr sz="2000" kern="1200" spc="50">
+                <a:solidFill>
+                  <a:schemeClr val="tx1">
+                    <a:alpha val="60000"/>
+                  </a:schemeClr>
+                </a:solidFill>
+                <a:latin typeface="+mn-lt"/>
+                <a:ea typeface="+mn-ea"/>
+                <a:cs typeface="+mn-cs"/>
+              </a:defRPr>
+            </a:lvl1pPr>
+            <a:lvl2pPr marL="457200" indent="0" algn="l" defTabSz="914400" rtl="0" eaLnBrk="1" latinLnBrk="0" hangingPunct="1">
+              <a:lnSpc>
+                <a:spcPct val="150000"/>
+              </a:lnSpc>
+              <a:spcBef>
+                <a:spcPts val="500"/>
+              </a:spcBef>
+              <a:buFontTx/>
+              <a:buNone/>
+              <a:defRPr sz="1400" b="0" i="1" kern="1200" spc="50" baseline="0">
+                <a:solidFill>
+                  <a:schemeClr val="tx1">
+                    <a:alpha val="60000"/>
+                  </a:schemeClr>
+                </a:solidFill>
+                <a:latin typeface="+mn-lt"/>
+                <a:ea typeface="+mn-ea"/>
+                <a:cs typeface="+mn-cs"/>
+              </a:defRPr>
+            </a:lvl2pPr>
+            <a:lvl3pPr marL="914400" indent="0" algn="l" defTabSz="914400" rtl="0" eaLnBrk="1" latinLnBrk="0" hangingPunct="1">
+              <a:lnSpc>
+                <a:spcPct val="150000"/>
+              </a:lnSpc>
+              <a:spcBef>
+                <a:spcPts val="500"/>
+              </a:spcBef>
+              <a:buClr>
+                <a:schemeClr val="accent3"/>
+              </a:buClr>
+              <a:buFont typeface="Wingdings" panose="05000000000000000000" pitchFamily="2" charset="2"/>
+              <a:buNone/>
+              <a:defRPr sz="1200" kern="1200" spc="50">
+                <a:solidFill>
+                  <a:schemeClr val="tx1">
+                    <a:alpha val="60000"/>
+                  </a:schemeClr>
+                </a:solidFill>
+                <a:latin typeface="+mn-lt"/>
+                <a:ea typeface="+mn-ea"/>
+                <a:cs typeface="+mn-cs"/>
+              </a:defRPr>
+            </a:lvl3pPr>
+            <a:lvl4pPr marL="1371600" indent="0" algn="l" defTabSz="914400" rtl="0" eaLnBrk="1" latinLnBrk="0" hangingPunct="1">
+              <a:lnSpc>
+                <a:spcPct val="150000"/>
+              </a:lnSpc>
+              <a:spcBef>
+                <a:spcPts val="500"/>
+              </a:spcBef>
+              <a:buClr>
+                <a:schemeClr val="accent3"/>
+              </a:buClr>
+              <a:buFontTx/>
+              <a:buNone/>
+              <a:defRPr sz="1000" b="0" i="1" kern="1200" spc="50" baseline="0">
+                <a:solidFill>
+                  <a:schemeClr val="tx1">
+                    <a:alpha val="60000"/>
+                  </a:schemeClr>
+                </a:solidFill>
+                <a:latin typeface="+mn-lt"/>
+                <a:ea typeface="+mn-ea"/>
+                <a:cs typeface="+mn-cs"/>
+              </a:defRPr>
+            </a:lvl4pPr>
+            <a:lvl5pPr marL="1828800" indent="0" algn="l" defTabSz="914400" rtl="0" eaLnBrk="1" latinLnBrk="0" hangingPunct="1">
+              <a:lnSpc>
+                <a:spcPct val="150000"/>
+              </a:lnSpc>
+              <a:spcBef>
+                <a:spcPts val="500"/>
+              </a:spcBef>
+              <a:buClr>
+                <a:schemeClr val="accent3"/>
+              </a:buClr>
+              <a:buFont typeface="Wingdings" panose="05000000000000000000" pitchFamily="2" charset="2"/>
+              <a:buNone/>
+              <a:defRPr sz="1000" kern="1200" spc="50">
+                <a:solidFill>
+                  <a:schemeClr val="tx1">
+                    <a:alpha val="60000"/>
+                  </a:schemeClr>
+                </a:solidFill>
+                <a:latin typeface="+mn-lt"/>
+                <a:ea typeface="+mn-ea"/>
+                <a:cs typeface="+mn-cs"/>
+              </a:defRPr>
+            </a:lvl5pPr>
+            <a:lvl6pPr marL="2286000" indent="0" algn="l" defTabSz="914400" rtl="0" eaLnBrk="1" latinLnBrk="0" hangingPunct="1">
+              <a:lnSpc>
+                <a:spcPct val="90000"/>
+              </a:lnSpc>
+              <a:spcBef>
+                <a:spcPts val="500"/>
+              </a:spcBef>
+              <a:buFont typeface="Arial" panose="020B0604020202020204" pitchFamily="34" charset="0"/>
+              <a:buNone/>
+              <a:defRPr sz="1000" kern="1200">
+                <a:solidFill>
+                  <a:schemeClr val="tx1"/>
+                </a:solidFill>
+                <a:latin typeface="+mn-lt"/>
+                <a:ea typeface="+mn-ea"/>
+                <a:cs typeface="+mn-cs"/>
+              </a:defRPr>
+            </a:lvl6pPr>
+            <a:lvl7pPr marL="2743200" indent="0" algn="l" defTabSz="914400" rtl="0" eaLnBrk="1" latinLnBrk="0" hangingPunct="1">
+              <a:lnSpc>
+                <a:spcPct val="90000"/>
+              </a:lnSpc>
+              <a:spcBef>
+                <a:spcPts val="500"/>
+              </a:spcBef>
+              <a:buFont typeface="Arial" panose="020B0604020202020204" pitchFamily="34" charset="0"/>
+              <a:buNone/>
+              <a:defRPr sz="1000" kern="1200">
+                <a:solidFill>
+                  <a:schemeClr val="tx1"/>
+                </a:solidFill>
+                <a:latin typeface="+mn-lt"/>
+                <a:ea typeface="+mn-ea"/>
+                <a:cs typeface="+mn-cs"/>
+              </a:defRPr>
+            </a:lvl7pPr>
+            <a:lvl8pPr marL="3200400" indent="0" algn="l" defTabSz="914400" rtl="0" eaLnBrk="1" latinLnBrk="0" hangingPunct="1">
+              <a:lnSpc>
+                <a:spcPct val="90000"/>
+              </a:lnSpc>
+              <a:spcBef>
+                <a:spcPts val="500"/>
+              </a:spcBef>
+              <a:buFont typeface="Arial" panose="020B0604020202020204" pitchFamily="34" charset="0"/>
+              <a:buNone/>
+              <a:defRPr sz="1000" kern="1200">
+                <a:solidFill>
+                  <a:schemeClr val="tx1"/>
+                </a:solidFill>
+                <a:latin typeface="+mn-lt"/>
+                <a:ea typeface="+mn-ea"/>
+                <a:cs typeface="+mn-cs"/>
+              </a:defRPr>
+            </a:lvl8pPr>
+            <a:lvl9pPr marL="3657600" indent="0" algn="l" defTabSz="914400" rtl="0" eaLnBrk="1" latinLnBrk="0" hangingPunct="1">
+              <a:lnSpc>
+                <a:spcPct val="90000"/>
+              </a:lnSpc>
+              <a:spcBef>
+                <a:spcPts val="500"/>
+              </a:spcBef>
+              <a:buFont typeface="Arial" panose="020B0604020202020204" pitchFamily="34" charset="0"/>
+              <a:buNone/>
+              <a:defRPr sz="1000" kern="1200">
+                <a:solidFill>
+                  <a:schemeClr val="tx1"/>
+                </a:solidFill>
+                <a:latin typeface="+mn-lt"/>
+                <a:ea typeface="+mn-ea"/>
+                <a:cs typeface="+mn-cs"/>
+              </a:defRPr>
+            </a:lvl9pPr>
+          </a:lstStyle>
+          <a:p>
+            <a:pPr>
+              <a:lnSpc>
+                <a:spcPct val="140000"/>
+              </a:lnSpc>
+            </a:pPr>
+            <a:r>
+              <a:rPr lang="en-US" sz="1400" dirty="0"/>
+              <a:t>Fig. 11: Sending command.</a:t>
+            </a:r>
+          </a:p>
+        </p:txBody>
+      </p:sp>
+      <p:sp>
+        <p:nvSpPr>
+          <p:cNvPr id="6" name="Text Placeholder 3">
+            <a:extLst>
+              <a:ext uri="{FF2B5EF4-FFF2-40B4-BE49-F238E27FC236}">
+                <a16:creationId xmlns:a16="http://schemas.microsoft.com/office/drawing/2014/main" id="{273E1F3F-37A4-D2E2-D8C5-FDE770FFDB4F}"/>
+              </a:ext>
+            </a:extLst>
+          </p:cNvPr>
+          <p:cNvSpPr txBox="1">
+            <a:spLocks/>
+          </p:cNvSpPr>
+          <p:nvPr/>
+        </p:nvSpPr>
+        <p:spPr>
+          <a:xfrm>
+            <a:off x="988071" y="6316511"/>
+            <a:ext cx="2820358" cy="343513"/>
+          </a:xfrm>
+          <a:prstGeom prst="rect">
+            <a:avLst/>
+          </a:prstGeom>
+        </p:spPr>
+        <p:txBody>
+          <a:bodyPr vert="horz" lIns="91440" tIns="45720" rIns="91440" bIns="45720" rtlCol="0">
+            <a:normAutofit lnSpcReduction="10000"/>
+          </a:bodyPr>
+          <a:lstStyle>
+            <a:lvl1pPr marL="0" indent="0" algn="l" defTabSz="914400" rtl="0" eaLnBrk="1" latinLnBrk="0" hangingPunct="1">
+              <a:lnSpc>
+                <a:spcPct val="150000"/>
+              </a:lnSpc>
+              <a:spcBef>
+                <a:spcPts val="1000"/>
+              </a:spcBef>
+              <a:buClr>
+                <a:schemeClr val="accent3"/>
+              </a:buClr>
+              <a:buFont typeface="Wingdings" panose="05000000000000000000" pitchFamily="2" charset="2"/>
+              <a:buNone/>
+              <a:defRPr sz="2000" kern="1200" spc="50">
+                <a:solidFill>
+                  <a:schemeClr val="tx1">
+                    <a:alpha val="60000"/>
+                  </a:schemeClr>
+                </a:solidFill>
+                <a:latin typeface="+mn-lt"/>
+                <a:ea typeface="+mn-ea"/>
+                <a:cs typeface="+mn-cs"/>
+              </a:defRPr>
+            </a:lvl1pPr>
+            <a:lvl2pPr marL="457200" indent="0" algn="l" defTabSz="914400" rtl="0" eaLnBrk="1" latinLnBrk="0" hangingPunct="1">
+              <a:lnSpc>
+                <a:spcPct val="150000"/>
+              </a:lnSpc>
+              <a:spcBef>
+                <a:spcPts val="500"/>
+              </a:spcBef>
+              <a:buFontTx/>
+              <a:buNone/>
+              <a:defRPr sz="1400" b="0" i="1" kern="1200" spc="50" baseline="0">
+                <a:solidFill>
+                  <a:schemeClr val="tx1">
+                    <a:alpha val="60000"/>
+                  </a:schemeClr>
+                </a:solidFill>
+                <a:latin typeface="+mn-lt"/>
+                <a:ea typeface="+mn-ea"/>
+                <a:cs typeface="+mn-cs"/>
+              </a:defRPr>
+            </a:lvl2pPr>
+            <a:lvl3pPr marL="914400" indent="0" algn="l" defTabSz="914400" rtl="0" eaLnBrk="1" latinLnBrk="0" hangingPunct="1">
+              <a:lnSpc>
+                <a:spcPct val="150000"/>
+              </a:lnSpc>
+              <a:spcBef>
+                <a:spcPts val="500"/>
+              </a:spcBef>
+              <a:buClr>
+                <a:schemeClr val="accent3"/>
+              </a:buClr>
+              <a:buFont typeface="Wingdings" panose="05000000000000000000" pitchFamily="2" charset="2"/>
+              <a:buNone/>
+              <a:defRPr sz="1200" kern="1200" spc="50">
+                <a:solidFill>
+                  <a:schemeClr val="tx1">
+                    <a:alpha val="60000"/>
+                  </a:schemeClr>
+                </a:solidFill>
+                <a:latin typeface="+mn-lt"/>
+                <a:ea typeface="+mn-ea"/>
+                <a:cs typeface="+mn-cs"/>
+              </a:defRPr>
+            </a:lvl3pPr>
+            <a:lvl4pPr marL="1371600" indent="0" algn="l" defTabSz="914400" rtl="0" eaLnBrk="1" latinLnBrk="0" hangingPunct="1">
+              <a:lnSpc>
+                <a:spcPct val="150000"/>
+              </a:lnSpc>
+              <a:spcBef>
+                <a:spcPts val="500"/>
+              </a:spcBef>
+              <a:buClr>
+                <a:schemeClr val="accent3"/>
+              </a:buClr>
+              <a:buFontTx/>
+              <a:buNone/>
+              <a:defRPr sz="1000" b="0" i="1" kern="1200" spc="50" baseline="0">
+                <a:solidFill>
+                  <a:schemeClr val="tx1">
+                    <a:alpha val="60000"/>
+                  </a:schemeClr>
+                </a:solidFill>
+                <a:latin typeface="+mn-lt"/>
+                <a:ea typeface="+mn-ea"/>
+                <a:cs typeface="+mn-cs"/>
+              </a:defRPr>
+            </a:lvl4pPr>
+            <a:lvl5pPr marL="1828800" indent="0" algn="l" defTabSz="914400" rtl="0" eaLnBrk="1" latinLnBrk="0" hangingPunct="1">
+              <a:lnSpc>
+                <a:spcPct val="150000"/>
+              </a:lnSpc>
+              <a:spcBef>
+                <a:spcPts val="500"/>
+              </a:spcBef>
+              <a:buClr>
+                <a:schemeClr val="accent3"/>
+              </a:buClr>
+              <a:buFont typeface="Wingdings" panose="05000000000000000000" pitchFamily="2" charset="2"/>
+              <a:buNone/>
+              <a:defRPr sz="1000" kern="1200" spc="50">
+                <a:solidFill>
+                  <a:schemeClr val="tx1">
+                    <a:alpha val="60000"/>
+                  </a:schemeClr>
+                </a:solidFill>
+                <a:latin typeface="+mn-lt"/>
+                <a:ea typeface="+mn-ea"/>
+                <a:cs typeface="+mn-cs"/>
+              </a:defRPr>
+            </a:lvl5pPr>
+            <a:lvl6pPr marL="2286000" indent="0" algn="l" defTabSz="914400" rtl="0" eaLnBrk="1" latinLnBrk="0" hangingPunct="1">
+              <a:lnSpc>
+                <a:spcPct val="90000"/>
+              </a:lnSpc>
+              <a:spcBef>
+                <a:spcPts val="500"/>
+              </a:spcBef>
+              <a:buFont typeface="Arial" panose="020B0604020202020204" pitchFamily="34" charset="0"/>
+              <a:buNone/>
+              <a:defRPr sz="1000" kern="1200">
+                <a:solidFill>
+                  <a:schemeClr val="tx1"/>
+                </a:solidFill>
+                <a:latin typeface="+mn-lt"/>
+                <a:ea typeface="+mn-ea"/>
+                <a:cs typeface="+mn-cs"/>
+              </a:defRPr>
+            </a:lvl6pPr>
+            <a:lvl7pPr marL="2743200" indent="0" algn="l" defTabSz="914400" rtl="0" eaLnBrk="1" latinLnBrk="0" hangingPunct="1">
+              <a:lnSpc>
+                <a:spcPct val="90000"/>
+              </a:lnSpc>
+              <a:spcBef>
+                <a:spcPts val="500"/>
+              </a:spcBef>
+              <a:buFont typeface="Arial" panose="020B0604020202020204" pitchFamily="34" charset="0"/>
+              <a:buNone/>
+              <a:defRPr sz="1000" kern="1200">
+                <a:solidFill>
+                  <a:schemeClr val="tx1"/>
+                </a:solidFill>
+                <a:latin typeface="+mn-lt"/>
+                <a:ea typeface="+mn-ea"/>
+                <a:cs typeface="+mn-cs"/>
+              </a:defRPr>
+            </a:lvl7pPr>
+            <a:lvl8pPr marL="3200400" indent="0" algn="l" defTabSz="914400" rtl="0" eaLnBrk="1" latinLnBrk="0" hangingPunct="1">
+              <a:lnSpc>
+                <a:spcPct val="90000"/>
+              </a:lnSpc>
+              <a:spcBef>
+                <a:spcPts val="500"/>
+              </a:spcBef>
+              <a:buFont typeface="Arial" panose="020B0604020202020204" pitchFamily="34" charset="0"/>
+              <a:buNone/>
+              <a:defRPr sz="1000" kern="1200">
+                <a:solidFill>
+                  <a:schemeClr val="tx1"/>
+                </a:solidFill>
+                <a:latin typeface="+mn-lt"/>
+                <a:ea typeface="+mn-ea"/>
+                <a:cs typeface="+mn-cs"/>
+              </a:defRPr>
+            </a:lvl8pPr>
+            <a:lvl9pPr marL="3657600" indent="0" algn="l" defTabSz="914400" rtl="0" eaLnBrk="1" latinLnBrk="0" hangingPunct="1">
+              <a:lnSpc>
+                <a:spcPct val="90000"/>
+              </a:lnSpc>
+              <a:spcBef>
+                <a:spcPts val="500"/>
+              </a:spcBef>
+              <a:buFont typeface="Arial" panose="020B0604020202020204" pitchFamily="34" charset="0"/>
+              <a:buNone/>
+              <a:defRPr sz="1000" kern="1200">
+                <a:solidFill>
+                  <a:schemeClr val="tx1"/>
+                </a:solidFill>
+                <a:latin typeface="+mn-lt"/>
+                <a:ea typeface="+mn-ea"/>
+                <a:cs typeface="+mn-cs"/>
+              </a:defRPr>
+            </a:lvl9pPr>
+          </a:lstStyle>
+          <a:p>
+            <a:pPr>
+              <a:lnSpc>
+                <a:spcPct val="140000"/>
+              </a:lnSpc>
+            </a:pPr>
+            <a:r>
+              <a:rPr lang="en-US" sz="1400" dirty="0"/>
+              <a:t>Fig. 12: Response.</a:t>
+            </a:r>
+          </a:p>
+        </p:txBody>
+      </p:sp>
     </p:spTree>
     <p:extLst>
       <p:ext uri="{BB962C8B-B14F-4D97-AF65-F5344CB8AC3E}">
@@ -16486,6 +17164,232 @@
           </a:prstGeom>
         </p:spPr>
       </p:pic>
+      <p:sp>
+        <p:nvSpPr>
+          <p:cNvPr id="3" name="Text Placeholder 3">
+            <a:extLst>
+              <a:ext uri="{FF2B5EF4-FFF2-40B4-BE49-F238E27FC236}">
+                <a16:creationId xmlns:a16="http://schemas.microsoft.com/office/drawing/2014/main" id="{66AAEFAF-820D-9A43-7BA7-D639728B01D5}"/>
+              </a:ext>
+            </a:extLst>
+          </p:cNvPr>
+          <p:cNvSpPr txBox="1">
+            <a:spLocks/>
+          </p:cNvSpPr>
+          <p:nvPr/>
+        </p:nvSpPr>
+        <p:spPr>
+          <a:xfrm>
+            <a:off x="1251861" y="6610770"/>
+            <a:ext cx="2603702" cy="247230"/>
+          </a:xfrm>
+          <a:prstGeom prst="rect">
+            <a:avLst/>
+          </a:prstGeom>
+        </p:spPr>
+        <p:txBody>
+          <a:bodyPr vert="horz" lIns="91440" tIns="45720" rIns="91440" bIns="45720" rtlCol="0">
+            <a:normAutofit fontScale="62500" lnSpcReduction="20000"/>
+          </a:bodyPr>
+          <a:lstStyle>
+            <a:lvl1pPr marL="0" indent="0" algn="l" defTabSz="914400" rtl="0" eaLnBrk="1" latinLnBrk="0" hangingPunct="1">
+              <a:lnSpc>
+                <a:spcPct val="150000"/>
+              </a:lnSpc>
+              <a:spcBef>
+                <a:spcPts val="1000"/>
+              </a:spcBef>
+              <a:buClr>
+                <a:schemeClr val="accent3"/>
+              </a:buClr>
+              <a:buFont typeface="Wingdings" panose="05000000000000000000" pitchFamily="2" charset="2"/>
+              <a:buNone/>
+              <a:defRPr sz="2000" kern="1200" spc="50">
+                <a:solidFill>
+                  <a:schemeClr val="tx1">
+                    <a:alpha val="60000"/>
+                  </a:schemeClr>
+                </a:solidFill>
+                <a:latin typeface="+mn-lt"/>
+                <a:ea typeface="+mn-ea"/>
+                <a:cs typeface="+mn-cs"/>
+              </a:defRPr>
+            </a:lvl1pPr>
+            <a:lvl2pPr marL="457200" indent="0" algn="l" defTabSz="914400" rtl="0" eaLnBrk="1" latinLnBrk="0" hangingPunct="1">
+              <a:lnSpc>
+                <a:spcPct val="150000"/>
+              </a:lnSpc>
+              <a:spcBef>
+                <a:spcPts val="500"/>
+              </a:spcBef>
+              <a:buFontTx/>
+              <a:buNone/>
+              <a:defRPr sz="1400" b="0" i="1" kern="1200" spc="50" baseline="0">
+                <a:solidFill>
+                  <a:schemeClr val="tx1">
+                    <a:alpha val="60000"/>
+                  </a:schemeClr>
+                </a:solidFill>
+                <a:latin typeface="+mn-lt"/>
+                <a:ea typeface="+mn-ea"/>
+                <a:cs typeface="+mn-cs"/>
+              </a:defRPr>
+            </a:lvl2pPr>
+            <a:lvl3pPr marL="914400" indent="0" algn="l" defTabSz="914400" rtl="0" eaLnBrk="1" latinLnBrk="0" hangingPunct="1">
+              <a:lnSpc>
+                <a:spcPct val="150000"/>
+              </a:lnSpc>
+              <a:spcBef>
+                <a:spcPts val="500"/>
+              </a:spcBef>
+              <a:buClr>
+                <a:schemeClr val="accent3"/>
+              </a:buClr>
+              <a:buFont typeface="Wingdings" panose="05000000000000000000" pitchFamily="2" charset="2"/>
+              <a:buNone/>
+              <a:defRPr sz="1200" kern="1200" spc="50">
+                <a:solidFill>
+                  <a:schemeClr val="tx1">
+                    <a:alpha val="60000"/>
+                  </a:schemeClr>
+                </a:solidFill>
+                <a:latin typeface="+mn-lt"/>
+                <a:ea typeface="+mn-ea"/>
+                <a:cs typeface="+mn-cs"/>
+              </a:defRPr>
+            </a:lvl3pPr>
+            <a:lvl4pPr marL="1371600" indent="0" algn="l" defTabSz="914400" rtl="0" eaLnBrk="1" latinLnBrk="0" hangingPunct="1">
+              <a:lnSpc>
+                <a:spcPct val="150000"/>
+              </a:lnSpc>
+              <a:spcBef>
+                <a:spcPts val="500"/>
+              </a:spcBef>
+              <a:buClr>
+                <a:schemeClr val="accent3"/>
+              </a:buClr>
+              <a:buFontTx/>
+              <a:buNone/>
+              <a:defRPr sz="1000" b="0" i="1" kern="1200" spc="50" baseline="0">
+                <a:solidFill>
+                  <a:schemeClr val="tx1">
+                    <a:alpha val="60000"/>
+                  </a:schemeClr>
+                </a:solidFill>
+                <a:latin typeface="+mn-lt"/>
+                <a:ea typeface="+mn-ea"/>
+                <a:cs typeface="+mn-cs"/>
+              </a:defRPr>
+            </a:lvl4pPr>
+            <a:lvl5pPr marL="1828800" indent="0" algn="l" defTabSz="914400" rtl="0" eaLnBrk="1" latinLnBrk="0" hangingPunct="1">
+              <a:lnSpc>
+                <a:spcPct val="150000"/>
+              </a:lnSpc>
+              <a:spcBef>
+                <a:spcPts val="500"/>
+              </a:spcBef>
+              <a:buClr>
+                <a:schemeClr val="accent3"/>
+              </a:buClr>
+              <a:buFont typeface="Wingdings" panose="05000000000000000000" pitchFamily="2" charset="2"/>
+              <a:buNone/>
+              <a:defRPr sz="1000" kern="1200" spc="50">
+                <a:solidFill>
+                  <a:schemeClr val="tx1">
+                    <a:alpha val="60000"/>
+                  </a:schemeClr>
+                </a:solidFill>
+                <a:latin typeface="+mn-lt"/>
+                <a:ea typeface="+mn-ea"/>
+                <a:cs typeface="+mn-cs"/>
+              </a:defRPr>
+            </a:lvl5pPr>
+            <a:lvl6pPr marL="2286000" indent="0" algn="l" defTabSz="914400" rtl="0" eaLnBrk="1" latinLnBrk="0" hangingPunct="1">
+              <a:lnSpc>
+                <a:spcPct val="90000"/>
+              </a:lnSpc>
+              <a:spcBef>
+                <a:spcPts val="500"/>
+              </a:spcBef>
+              <a:buFont typeface="Arial" panose="020B0604020202020204" pitchFamily="34" charset="0"/>
+              <a:buNone/>
+              <a:defRPr sz="1000" kern="1200">
+                <a:solidFill>
+                  <a:schemeClr val="tx1"/>
+                </a:solidFill>
+                <a:latin typeface="+mn-lt"/>
+                <a:ea typeface="+mn-ea"/>
+                <a:cs typeface="+mn-cs"/>
+              </a:defRPr>
+            </a:lvl6pPr>
+            <a:lvl7pPr marL="2743200" indent="0" algn="l" defTabSz="914400" rtl="0" eaLnBrk="1" latinLnBrk="0" hangingPunct="1">
+              <a:lnSpc>
+                <a:spcPct val="90000"/>
+              </a:lnSpc>
+              <a:spcBef>
+                <a:spcPts val="500"/>
+              </a:spcBef>
+              <a:buFont typeface="Arial" panose="020B0604020202020204" pitchFamily="34" charset="0"/>
+              <a:buNone/>
+              <a:defRPr sz="1000" kern="1200">
+                <a:solidFill>
+                  <a:schemeClr val="tx1"/>
+                </a:solidFill>
+                <a:latin typeface="+mn-lt"/>
+                <a:ea typeface="+mn-ea"/>
+                <a:cs typeface="+mn-cs"/>
+              </a:defRPr>
+            </a:lvl7pPr>
+            <a:lvl8pPr marL="3200400" indent="0" algn="l" defTabSz="914400" rtl="0" eaLnBrk="1" latinLnBrk="0" hangingPunct="1">
+              <a:lnSpc>
+                <a:spcPct val="90000"/>
+              </a:lnSpc>
+              <a:spcBef>
+                <a:spcPts val="500"/>
+              </a:spcBef>
+              <a:buFont typeface="Arial" panose="020B0604020202020204" pitchFamily="34" charset="0"/>
+              <a:buNone/>
+              <a:defRPr sz="1000" kern="1200">
+                <a:solidFill>
+                  <a:schemeClr val="tx1"/>
+                </a:solidFill>
+                <a:latin typeface="+mn-lt"/>
+                <a:ea typeface="+mn-ea"/>
+                <a:cs typeface="+mn-cs"/>
+              </a:defRPr>
+            </a:lvl8pPr>
+            <a:lvl9pPr marL="3657600" indent="0" algn="l" defTabSz="914400" rtl="0" eaLnBrk="1" latinLnBrk="0" hangingPunct="1">
+              <a:lnSpc>
+                <a:spcPct val="90000"/>
+              </a:lnSpc>
+              <a:spcBef>
+                <a:spcPts val="500"/>
+              </a:spcBef>
+              <a:buFont typeface="Arial" panose="020B0604020202020204" pitchFamily="34" charset="0"/>
+              <a:buNone/>
+              <a:defRPr sz="1000" kern="1200">
+                <a:solidFill>
+                  <a:schemeClr val="tx1"/>
+                </a:solidFill>
+                <a:latin typeface="+mn-lt"/>
+                <a:ea typeface="+mn-ea"/>
+                <a:cs typeface="+mn-cs"/>
+              </a:defRPr>
+            </a:lvl9pPr>
+          </a:lstStyle>
+          <a:p>
+            <a:pPr>
+              <a:lnSpc>
+                <a:spcPct val="140000"/>
+              </a:lnSpc>
+            </a:pPr>
+            <a:r>
+              <a:rPr lang="en-US" sz="1400" dirty="0"/>
+              <a:t>Fig. 13: Compiler bot.</a:t>
+            </a:r>
+          </a:p>
+        </p:txBody>
+      </p:sp>
     </p:spTree>
     <p:extLst>
       <p:ext uri="{BB962C8B-B14F-4D97-AF65-F5344CB8AC3E}">
@@ -17233,6 +18137,910 @@
           </a:prstGeom>
         </p:spPr>
       </p:pic>
+      <p:sp>
+        <p:nvSpPr>
+          <p:cNvPr id="3" name="Text Placeholder 3">
+            <a:extLst>
+              <a:ext uri="{FF2B5EF4-FFF2-40B4-BE49-F238E27FC236}">
+                <a16:creationId xmlns:a16="http://schemas.microsoft.com/office/drawing/2014/main" id="{D69F23D9-EB37-4381-19FD-E1932609B11C}"/>
+              </a:ext>
+            </a:extLst>
+          </p:cNvPr>
+          <p:cNvSpPr txBox="1">
+            <a:spLocks/>
+          </p:cNvSpPr>
+          <p:nvPr/>
+        </p:nvSpPr>
+        <p:spPr>
+          <a:xfrm>
+            <a:off x="541339" y="5934417"/>
+            <a:ext cx="2577600" cy="343513"/>
+          </a:xfrm>
+          <a:prstGeom prst="rect">
+            <a:avLst/>
+          </a:prstGeom>
+        </p:spPr>
+        <p:txBody>
+          <a:bodyPr vert="horz" lIns="91440" tIns="45720" rIns="91440" bIns="45720" rtlCol="0">
+            <a:normAutofit lnSpcReduction="10000"/>
+          </a:bodyPr>
+          <a:lstStyle>
+            <a:lvl1pPr marL="0" indent="0" algn="l" defTabSz="914400" rtl="0" eaLnBrk="1" latinLnBrk="0" hangingPunct="1">
+              <a:lnSpc>
+                <a:spcPct val="150000"/>
+              </a:lnSpc>
+              <a:spcBef>
+                <a:spcPts val="1000"/>
+              </a:spcBef>
+              <a:buClr>
+                <a:schemeClr val="accent3"/>
+              </a:buClr>
+              <a:buFont typeface="Wingdings" panose="05000000000000000000" pitchFamily="2" charset="2"/>
+              <a:buNone/>
+              <a:defRPr sz="2000" kern="1200" spc="50">
+                <a:solidFill>
+                  <a:schemeClr val="tx1">
+                    <a:alpha val="60000"/>
+                  </a:schemeClr>
+                </a:solidFill>
+                <a:latin typeface="+mn-lt"/>
+                <a:ea typeface="+mn-ea"/>
+                <a:cs typeface="+mn-cs"/>
+              </a:defRPr>
+            </a:lvl1pPr>
+            <a:lvl2pPr marL="457200" indent="0" algn="l" defTabSz="914400" rtl="0" eaLnBrk="1" latinLnBrk="0" hangingPunct="1">
+              <a:lnSpc>
+                <a:spcPct val="150000"/>
+              </a:lnSpc>
+              <a:spcBef>
+                <a:spcPts val="500"/>
+              </a:spcBef>
+              <a:buFontTx/>
+              <a:buNone/>
+              <a:defRPr sz="1400" b="0" i="1" kern="1200" spc="50" baseline="0">
+                <a:solidFill>
+                  <a:schemeClr val="tx1">
+                    <a:alpha val="60000"/>
+                  </a:schemeClr>
+                </a:solidFill>
+                <a:latin typeface="+mn-lt"/>
+                <a:ea typeface="+mn-ea"/>
+                <a:cs typeface="+mn-cs"/>
+              </a:defRPr>
+            </a:lvl2pPr>
+            <a:lvl3pPr marL="914400" indent="0" algn="l" defTabSz="914400" rtl="0" eaLnBrk="1" latinLnBrk="0" hangingPunct="1">
+              <a:lnSpc>
+                <a:spcPct val="150000"/>
+              </a:lnSpc>
+              <a:spcBef>
+                <a:spcPts val="500"/>
+              </a:spcBef>
+              <a:buClr>
+                <a:schemeClr val="accent3"/>
+              </a:buClr>
+              <a:buFont typeface="Wingdings" panose="05000000000000000000" pitchFamily="2" charset="2"/>
+              <a:buNone/>
+              <a:defRPr sz="1200" kern="1200" spc="50">
+                <a:solidFill>
+                  <a:schemeClr val="tx1">
+                    <a:alpha val="60000"/>
+                  </a:schemeClr>
+                </a:solidFill>
+                <a:latin typeface="+mn-lt"/>
+                <a:ea typeface="+mn-ea"/>
+                <a:cs typeface="+mn-cs"/>
+              </a:defRPr>
+            </a:lvl3pPr>
+            <a:lvl4pPr marL="1371600" indent="0" algn="l" defTabSz="914400" rtl="0" eaLnBrk="1" latinLnBrk="0" hangingPunct="1">
+              <a:lnSpc>
+                <a:spcPct val="150000"/>
+              </a:lnSpc>
+              <a:spcBef>
+                <a:spcPts val="500"/>
+              </a:spcBef>
+              <a:buClr>
+                <a:schemeClr val="accent3"/>
+              </a:buClr>
+              <a:buFontTx/>
+              <a:buNone/>
+              <a:defRPr sz="1000" b="0" i="1" kern="1200" spc="50" baseline="0">
+                <a:solidFill>
+                  <a:schemeClr val="tx1">
+                    <a:alpha val="60000"/>
+                  </a:schemeClr>
+                </a:solidFill>
+                <a:latin typeface="+mn-lt"/>
+                <a:ea typeface="+mn-ea"/>
+                <a:cs typeface="+mn-cs"/>
+              </a:defRPr>
+            </a:lvl4pPr>
+            <a:lvl5pPr marL="1828800" indent="0" algn="l" defTabSz="914400" rtl="0" eaLnBrk="1" latinLnBrk="0" hangingPunct="1">
+              <a:lnSpc>
+                <a:spcPct val="150000"/>
+              </a:lnSpc>
+              <a:spcBef>
+                <a:spcPts val="500"/>
+              </a:spcBef>
+              <a:buClr>
+                <a:schemeClr val="accent3"/>
+              </a:buClr>
+              <a:buFont typeface="Wingdings" panose="05000000000000000000" pitchFamily="2" charset="2"/>
+              <a:buNone/>
+              <a:defRPr sz="1000" kern="1200" spc="50">
+                <a:solidFill>
+                  <a:schemeClr val="tx1">
+                    <a:alpha val="60000"/>
+                  </a:schemeClr>
+                </a:solidFill>
+                <a:latin typeface="+mn-lt"/>
+                <a:ea typeface="+mn-ea"/>
+                <a:cs typeface="+mn-cs"/>
+              </a:defRPr>
+            </a:lvl5pPr>
+            <a:lvl6pPr marL="2286000" indent="0" algn="l" defTabSz="914400" rtl="0" eaLnBrk="1" latinLnBrk="0" hangingPunct="1">
+              <a:lnSpc>
+                <a:spcPct val="90000"/>
+              </a:lnSpc>
+              <a:spcBef>
+                <a:spcPts val="500"/>
+              </a:spcBef>
+              <a:buFont typeface="Arial" panose="020B0604020202020204" pitchFamily="34" charset="0"/>
+              <a:buNone/>
+              <a:defRPr sz="1000" kern="1200">
+                <a:solidFill>
+                  <a:schemeClr val="tx1"/>
+                </a:solidFill>
+                <a:latin typeface="+mn-lt"/>
+                <a:ea typeface="+mn-ea"/>
+                <a:cs typeface="+mn-cs"/>
+              </a:defRPr>
+            </a:lvl6pPr>
+            <a:lvl7pPr marL="2743200" indent="0" algn="l" defTabSz="914400" rtl="0" eaLnBrk="1" latinLnBrk="0" hangingPunct="1">
+              <a:lnSpc>
+                <a:spcPct val="90000"/>
+              </a:lnSpc>
+              <a:spcBef>
+                <a:spcPts val="500"/>
+              </a:spcBef>
+              <a:buFont typeface="Arial" panose="020B0604020202020204" pitchFamily="34" charset="0"/>
+              <a:buNone/>
+              <a:defRPr sz="1000" kern="1200">
+                <a:solidFill>
+                  <a:schemeClr val="tx1"/>
+                </a:solidFill>
+                <a:latin typeface="+mn-lt"/>
+                <a:ea typeface="+mn-ea"/>
+                <a:cs typeface="+mn-cs"/>
+              </a:defRPr>
+            </a:lvl7pPr>
+            <a:lvl8pPr marL="3200400" indent="0" algn="l" defTabSz="914400" rtl="0" eaLnBrk="1" latinLnBrk="0" hangingPunct="1">
+              <a:lnSpc>
+                <a:spcPct val="90000"/>
+              </a:lnSpc>
+              <a:spcBef>
+                <a:spcPts val="500"/>
+              </a:spcBef>
+              <a:buFont typeface="Arial" panose="020B0604020202020204" pitchFamily="34" charset="0"/>
+              <a:buNone/>
+              <a:defRPr sz="1000" kern="1200">
+                <a:solidFill>
+                  <a:schemeClr val="tx1"/>
+                </a:solidFill>
+                <a:latin typeface="+mn-lt"/>
+                <a:ea typeface="+mn-ea"/>
+                <a:cs typeface="+mn-cs"/>
+              </a:defRPr>
+            </a:lvl8pPr>
+            <a:lvl9pPr marL="3657600" indent="0" algn="l" defTabSz="914400" rtl="0" eaLnBrk="1" latinLnBrk="0" hangingPunct="1">
+              <a:lnSpc>
+                <a:spcPct val="90000"/>
+              </a:lnSpc>
+              <a:spcBef>
+                <a:spcPts val="500"/>
+              </a:spcBef>
+              <a:buFont typeface="Arial" panose="020B0604020202020204" pitchFamily="34" charset="0"/>
+              <a:buNone/>
+              <a:defRPr sz="1000" kern="1200">
+                <a:solidFill>
+                  <a:schemeClr val="tx1"/>
+                </a:solidFill>
+                <a:latin typeface="+mn-lt"/>
+                <a:ea typeface="+mn-ea"/>
+                <a:cs typeface="+mn-cs"/>
+              </a:defRPr>
+            </a:lvl9pPr>
+          </a:lstStyle>
+          <a:p>
+            <a:pPr>
+              <a:lnSpc>
+                <a:spcPct val="140000"/>
+              </a:lnSpc>
+            </a:pPr>
+            <a:r>
+              <a:rPr lang="en-US" sz="1400" dirty="0"/>
+              <a:t>Fig. 14: Team creation.</a:t>
+            </a:r>
+          </a:p>
+        </p:txBody>
+      </p:sp>
+      <p:sp>
+        <p:nvSpPr>
+          <p:cNvPr id="4" name="Text Placeholder 3">
+            <a:extLst>
+              <a:ext uri="{FF2B5EF4-FFF2-40B4-BE49-F238E27FC236}">
+                <a16:creationId xmlns:a16="http://schemas.microsoft.com/office/drawing/2014/main" id="{D3FCFB76-F81B-0BC1-6CF0-5A5E9DB8322C}"/>
+              </a:ext>
+            </a:extLst>
+          </p:cNvPr>
+          <p:cNvSpPr txBox="1">
+            <a:spLocks/>
+          </p:cNvSpPr>
+          <p:nvPr/>
+        </p:nvSpPr>
+        <p:spPr>
+          <a:xfrm>
+            <a:off x="4174387" y="5934416"/>
+            <a:ext cx="2099013" cy="343513"/>
+          </a:xfrm>
+          <a:prstGeom prst="rect">
+            <a:avLst/>
+          </a:prstGeom>
+        </p:spPr>
+        <p:txBody>
+          <a:bodyPr vert="horz" lIns="91440" tIns="45720" rIns="91440" bIns="45720" rtlCol="0">
+            <a:normAutofit lnSpcReduction="10000"/>
+          </a:bodyPr>
+          <a:lstStyle>
+            <a:lvl1pPr marL="0" indent="0" algn="l" defTabSz="914400" rtl="0" eaLnBrk="1" latinLnBrk="0" hangingPunct="1">
+              <a:lnSpc>
+                <a:spcPct val="150000"/>
+              </a:lnSpc>
+              <a:spcBef>
+                <a:spcPts val="1000"/>
+              </a:spcBef>
+              <a:buClr>
+                <a:schemeClr val="accent3"/>
+              </a:buClr>
+              <a:buFont typeface="Wingdings" panose="05000000000000000000" pitchFamily="2" charset="2"/>
+              <a:buNone/>
+              <a:defRPr sz="2000" kern="1200" spc="50">
+                <a:solidFill>
+                  <a:schemeClr val="tx1">
+                    <a:alpha val="60000"/>
+                  </a:schemeClr>
+                </a:solidFill>
+                <a:latin typeface="+mn-lt"/>
+                <a:ea typeface="+mn-ea"/>
+                <a:cs typeface="+mn-cs"/>
+              </a:defRPr>
+            </a:lvl1pPr>
+            <a:lvl2pPr marL="457200" indent="0" algn="l" defTabSz="914400" rtl="0" eaLnBrk="1" latinLnBrk="0" hangingPunct="1">
+              <a:lnSpc>
+                <a:spcPct val="150000"/>
+              </a:lnSpc>
+              <a:spcBef>
+                <a:spcPts val="500"/>
+              </a:spcBef>
+              <a:buFontTx/>
+              <a:buNone/>
+              <a:defRPr sz="1400" b="0" i="1" kern="1200" spc="50" baseline="0">
+                <a:solidFill>
+                  <a:schemeClr val="tx1">
+                    <a:alpha val="60000"/>
+                  </a:schemeClr>
+                </a:solidFill>
+                <a:latin typeface="+mn-lt"/>
+                <a:ea typeface="+mn-ea"/>
+                <a:cs typeface="+mn-cs"/>
+              </a:defRPr>
+            </a:lvl2pPr>
+            <a:lvl3pPr marL="914400" indent="0" algn="l" defTabSz="914400" rtl="0" eaLnBrk="1" latinLnBrk="0" hangingPunct="1">
+              <a:lnSpc>
+                <a:spcPct val="150000"/>
+              </a:lnSpc>
+              <a:spcBef>
+                <a:spcPts val="500"/>
+              </a:spcBef>
+              <a:buClr>
+                <a:schemeClr val="accent3"/>
+              </a:buClr>
+              <a:buFont typeface="Wingdings" panose="05000000000000000000" pitchFamily="2" charset="2"/>
+              <a:buNone/>
+              <a:defRPr sz="1200" kern="1200" spc="50">
+                <a:solidFill>
+                  <a:schemeClr val="tx1">
+                    <a:alpha val="60000"/>
+                  </a:schemeClr>
+                </a:solidFill>
+                <a:latin typeface="+mn-lt"/>
+                <a:ea typeface="+mn-ea"/>
+                <a:cs typeface="+mn-cs"/>
+              </a:defRPr>
+            </a:lvl3pPr>
+            <a:lvl4pPr marL="1371600" indent="0" algn="l" defTabSz="914400" rtl="0" eaLnBrk="1" latinLnBrk="0" hangingPunct="1">
+              <a:lnSpc>
+                <a:spcPct val="150000"/>
+              </a:lnSpc>
+              <a:spcBef>
+                <a:spcPts val="500"/>
+              </a:spcBef>
+              <a:buClr>
+                <a:schemeClr val="accent3"/>
+              </a:buClr>
+              <a:buFontTx/>
+              <a:buNone/>
+              <a:defRPr sz="1000" b="0" i="1" kern="1200" spc="50" baseline="0">
+                <a:solidFill>
+                  <a:schemeClr val="tx1">
+                    <a:alpha val="60000"/>
+                  </a:schemeClr>
+                </a:solidFill>
+                <a:latin typeface="+mn-lt"/>
+                <a:ea typeface="+mn-ea"/>
+                <a:cs typeface="+mn-cs"/>
+              </a:defRPr>
+            </a:lvl4pPr>
+            <a:lvl5pPr marL="1828800" indent="0" algn="l" defTabSz="914400" rtl="0" eaLnBrk="1" latinLnBrk="0" hangingPunct="1">
+              <a:lnSpc>
+                <a:spcPct val="150000"/>
+              </a:lnSpc>
+              <a:spcBef>
+                <a:spcPts val="500"/>
+              </a:spcBef>
+              <a:buClr>
+                <a:schemeClr val="accent3"/>
+              </a:buClr>
+              <a:buFont typeface="Wingdings" panose="05000000000000000000" pitchFamily="2" charset="2"/>
+              <a:buNone/>
+              <a:defRPr sz="1000" kern="1200" spc="50">
+                <a:solidFill>
+                  <a:schemeClr val="tx1">
+                    <a:alpha val="60000"/>
+                  </a:schemeClr>
+                </a:solidFill>
+                <a:latin typeface="+mn-lt"/>
+                <a:ea typeface="+mn-ea"/>
+                <a:cs typeface="+mn-cs"/>
+              </a:defRPr>
+            </a:lvl5pPr>
+            <a:lvl6pPr marL="2286000" indent="0" algn="l" defTabSz="914400" rtl="0" eaLnBrk="1" latinLnBrk="0" hangingPunct="1">
+              <a:lnSpc>
+                <a:spcPct val="90000"/>
+              </a:lnSpc>
+              <a:spcBef>
+                <a:spcPts val="500"/>
+              </a:spcBef>
+              <a:buFont typeface="Arial" panose="020B0604020202020204" pitchFamily="34" charset="0"/>
+              <a:buNone/>
+              <a:defRPr sz="1000" kern="1200">
+                <a:solidFill>
+                  <a:schemeClr val="tx1"/>
+                </a:solidFill>
+                <a:latin typeface="+mn-lt"/>
+                <a:ea typeface="+mn-ea"/>
+                <a:cs typeface="+mn-cs"/>
+              </a:defRPr>
+            </a:lvl6pPr>
+            <a:lvl7pPr marL="2743200" indent="0" algn="l" defTabSz="914400" rtl="0" eaLnBrk="1" latinLnBrk="0" hangingPunct="1">
+              <a:lnSpc>
+                <a:spcPct val="90000"/>
+              </a:lnSpc>
+              <a:spcBef>
+                <a:spcPts val="500"/>
+              </a:spcBef>
+              <a:buFont typeface="Arial" panose="020B0604020202020204" pitchFamily="34" charset="0"/>
+              <a:buNone/>
+              <a:defRPr sz="1000" kern="1200">
+                <a:solidFill>
+                  <a:schemeClr val="tx1"/>
+                </a:solidFill>
+                <a:latin typeface="+mn-lt"/>
+                <a:ea typeface="+mn-ea"/>
+                <a:cs typeface="+mn-cs"/>
+              </a:defRPr>
+            </a:lvl7pPr>
+            <a:lvl8pPr marL="3200400" indent="0" algn="l" defTabSz="914400" rtl="0" eaLnBrk="1" latinLnBrk="0" hangingPunct="1">
+              <a:lnSpc>
+                <a:spcPct val="90000"/>
+              </a:lnSpc>
+              <a:spcBef>
+                <a:spcPts val="500"/>
+              </a:spcBef>
+              <a:buFont typeface="Arial" panose="020B0604020202020204" pitchFamily="34" charset="0"/>
+              <a:buNone/>
+              <a:defRPr sz="1000" kern="1200">
+                <a:solidFill>
+                  <a:schemeClr val="tx1"/>
+                </a:solidFill>
+                <a:latin typeface="+mn-lt"/>
+                <a:ea typeface="+mn-ea"/>
+                <a:cs typeface="+mn-cs"/>
+              </a:defRPr>
+            </a:lvl8pPr>
+            <a:lvl9pPr marL="3657600" indent="0" algn="l" defTabSz="914400" rtl="0" eaLnBrk="1" latinLnBrk="0" hangingPunct="1">
+              <a:lnSpc>
+                <a:spcPct val="90000"/>
+              </a:lnSpc>
+              <a:spcBef>
+                <a:spcPts val="500"/>
+              </a:spcBef>
+              <a:buFont typeface="Arial" panose="020B0604020202020204" pitchFamily="34" charset="0"/>
+              <a:buNone/>
+              <a:defRPr sz="1000" kern="1200">
+                <a:solidFill>
+                  <a:schemeClr val="tx1"/>
+                </a:solidFill>
+                <a:latin typeface="+mn-lt"/>
+                <a:ea typeface="+mn-ea"/>
+                <a:cs typeface="+mn-cs"/>
+              </a:defRPr>
+            </a:lvl9pPr>
+          </a:lstStyle>
+          <a:p>
+            <a:pPr>
+              <a:lnSpc>
+                <a:spcPct val="140000"/>
+              </a:lnSpc>
+            </a:pPr>
+            <a:r>
+              <a:rPr lang="en-US" sz="1400" dirty="0"/>
+              <a:t>Fig. 15: Leaderboard.</a:t>
+            </a:r>
+          </a:p>
+        </p:txBody>
+      </p:sp>
+      <p:sp>
+        <p:nvSpPr>
+          <p:cNvPr id="5" name="Text Placeholder 3">
+            <a:extLst>
+              <a:ext uri="{FF2B5EF4-FFF2-40B4-BE49-F238E27FC236}">
+                <a16:creationId xmlns:a16="http://schemas.microsoft.com/office/drawing/2014/main" id="{147C27B3-10DA-BD8E-F694-8019D8BB5EE8}"/>
+              </a:ext>
+            </a:extLst>
+          </p:cNvPr>
+          <p:cNvSpPr txBox="1">
+            <a:spLocks/>
+          </p:cNvSpPr>
+          <p:nvPr/>
+        </p:nvSpPr>
+        <p:spPr>
+          <a:xfrm>
+            <a:off x="6789075" y="4280870"/>
+            <a:ext cx="2577600" cy="343513"/>
+          </a:xfrm>
+          <a:prstGeom prst="rect">
+            <a:avLst/>
+          </a:prstGeom>
+        </p:spPr>
+        <p:txBody>
+          <a:bodyPr vert="horz" lIns="91440" tIns="45720" rIns="91440" bIns="45720" rtlCol="0">
+            <a:normAutofit lnSpcReduction="10000"/>
+          </a:bodyPr>
+          <a:lstStyle>
+            <a:lvl1pPr marL="0" indent="0" algn="l" defTabSz="914400" rtl="0" eaLnBrk="1" latinLnBrk="0" hangingPunct="1">
+              <a:lnSpc>
+                <a:spcPct val="150000"/>
+              </a:lnSpc>
+              <a:spcBef>
+                <a:spcPts val="1000"/>
+              </a:spcBef>
+              <a:buClr>
+                <a:schemeClr val="accent3"/>
+              </a:buClr>
+              <a:buFont typeface="Wingdings" panose="05000000000000000000" pitchFamily="2" charset="2"/>
+              <a:buNone/>
+              <a:defRPr sz="2000" kern="1200" spc="50">
+                <a:solidFill>
+                  <a:schemeClr val="tx1">
+                    <a:alpha val="60000"/>
+                  </a:schemeClr>
+                </a:solidFill>
+                <a:latin typeface="+mn-lt"/>
+                <a:ea typeface="+mn-ea"/>
+                <a:cs typeface="+mn-cs"/>
+              </a:defRPr>
+            </a:lvl1pPr>
+            <a:lvl2pPr marL="457200" indent="0" algn="l" defTabSz="914400" rtl="0" eaLnBrk="1" latinLnBrk="0" hangingPunct="1">
+              <a:lnSpc>
+                <a:spcPct val="150000"/>
+              </a:lnSpc>
+              <a:spcBef>
+                <a:spcPts val="500"/>
+              </a:spcBef>
+              <a:buFontTx/>
+              <a:buNone/>
+              <a:defRPr sz="1400" b="0" i="1" kern="1200" spc="50" baseline="0">
+                <a:solidFill>
+                  <a:schemeClr val="tx1">
+                    <a:alpha val="60000"/>
+                  </a:schemeClr>
+                </a:solidFill>
+                <a:latin typeface="+mn-lt"/>
+                <a:ea typeface="+mn-ea"/>
+                <a:cs typeface="+mn-cs"/>
+              </a:defRPr>
+            </a:lvl2pPr>
+            <a:lvl3pPr marL="914400" indent="0" algn="l" defTabSz="914400" rtl="0" eaLnBrk="1" latinLnBrk="0" hangingPunct="1">
+              <a:lnSpc>
+                <a:spcPct val="150000"/>
+              </a:lnSpc>
+              <a:spcBef>
+                <a:spcPts val="500"/>
+              </a:spcBef>
+              <a:buClr>
+                <a:schemeClr val="accent3"/>
+              </a:buClr>
+              <a:buFont typeface="Wingdings" panose="05000000000000000000" pitchFamily="2" charset="2"/>
+              <a:buNone/>
+              <a:defRPr sz="1200" kern="1200" spc="50">
+                <a:solidFill>
+                  <a:schemeClr val="tx1">
+                    <a:alpha val="60000"/>
+                  </a:schemeClr>
+                </a:solidFill>
+                <a:latin typeface="+mn-lt"/>
+                <a:ea typeface="+mn-ea"/>
+                <a:cs typeface="+mn-cs"/>
+              </a:defRPr>
+            </a:lvl3pPr>
+            <a:lvl4pPr marL="1371600" indent="0" algn="l" defTabSz="914400" rtl="0" eaLnBrk="1" latinLnBrk="0" hangingPunct="1">
+              <a:lnSpc>
+                <a:spcPct val="150000"/>
+              </a:lnSpc>
+              <a:spcBef>
+                <a:spcPts val="500"/>
+              </a:spcBef>
+              <a:buClr>
+                <a:schemeClr val="accent3"/>
+              </a:buClr>
+              <a:buFontTx/>
+              <a:buNone/>
+              <a:defRPr sz="1000" b="0" i="1" kern="1200" spc="50" baseline="0">
+                <a:solidFill>
+                  <a:schemeClr val="tx1">
+                    <a:alpha val="60000"/>
+                  </a:schemeClr>
+                </a:solidFill>
+                <a:latin typeface="+mn-lt"/>
+                <a:ea typeface="+mn-ea"/>
+                <a:cs typeface="+mn-cs"/>
+              </a:defRPr>
+            </a:lvl4pPr>
+            <a:lvl5pPr marL="1828800" indent="0" algn="l" defTabSz="914400" rtl="0" eaLnBrk="1" latinLnBrk="0" hangingPunct="1">
+              <a:lnSpc>
+                <a:spcPct val="150000"/>
+              </a:lnSpc>
+              <a:spcBef>
+                <a:spcPts val="500"/>
+              </a:spcBef>
+              <a:buClr>
+                <a:schemeClr val="accent3"/>
+              </a:buClr>
+              <a:buFont typeface="Wingdings" panose="05000000000000000000" pitchFamily="2" charset="2"/>
+              <a:buNone/>
+              <a:defRPr sz="1000" kern="1200" spc="50">
+                <a:solidFill>
+                  <a:schemeClr val="tx1">
+                    <a:alpha val="60000"/>
+                  </a:schemeClr>
+                </a:solidFill>
+                <a:latin typeface="+mn-lt"/>
+                <a:ea typeface="+mn-ea"/>
+                <a:cs typeface="+mn-cs"/>
+              </a:defRPr>
+            </a:lvl5pPr>
+            <a:lvl6pPr marL="2286000" indent="0" algn="l" defTabSz="914400" rtl="0" eaLnBrk="1" latinLnBrk="0" hangingPunct="1">
+              <a:lnSpc>
+                <a:spcPct val="90000"/>
+              </a:lnSpc>
+              <a:spcBef>
+                <a:spcPts val="500"/>
+              </a:spcBef>
+              <a:buFont typeface="Arial" panose="020B0604020202020204" pitchFamily="34" charset="0"/>
+              <a:buNone/>
+              <a:defRPr sz="1000" kern="1200">
+                <a:solidFill>
+                  <a:schemeClr val="tx1"/>
+                </a:solidFill>
+                <a:latin typeface="+mn-lt"/>
+                <a:ea typeface="+mn-ea"/>
+                <a:cs typeface="+mn-cs"/>
+              </a:defRPr>
+            </a:lvl6pPr>
+            <a:lvl7pPr marL="2743200" indent="0" algn="l" defTabSz="914400" rtl="0" eaLnBrk="1" latinLnBrk="0" hangingPunct="1">
+              <a:lnSpc>
+                <a:spcPct val="90000"/>
+              </a:lnSpc>
+              <a:spcBef>
+                <a:spcPts val="500"/>
+              </a:spcBef>
+              <a:buFont typeface="Arial" panose="020B0604020202020204" pitchFamily="34" charset="0"/>
+              <a:buNone/>
+              <a:defRPr sz="1000" kern="1200">
+                <a:solidFill>
+                  <a:schemeClr val="tx1"/>
+                </a:solidFill>
+                <a:latin typeface="+mn-lt"/>
+                <a:ea typeface="+mn-ea"/>
+                <a:cs typeface="+mn-cs"/>
+              </a:defRPr>
+            </a:lvl7pPr>
+            <a:lvl8pPr marL="3200400" indent="0" algn="l" defTabSz="914400" rtl="0" eaLnBrk="1" latinLnBrk="0" hangingPunct="1">
+              <a:lnSpc>
+                <a:spcPct val="90000"/>
+              </a:lnSpc>
+              <a:spcBef>
+                <a:spcPts val="500"/>
+              </a:spcBef>
+              <a:buFont typeface="Arial" panose="020B0604020202020204" pitchFamily="34" charset="0"/>
+              <a:buNone/>
+              <a:defRPr sz="1000" kern="1200">
+                <a:solidFill>
+                  <a:schemeClr val="tx1"/>
+                </a:solidFill>
+                <a:latin typeface="+mn-lt"/>
+                <a:ea typeface="+mn-ea"/>
+                <a:cs typeface="+mn-cs"/>
+              </a:defRPr>
+            </a:lvl8pPr>
+            <a:lvl9pPr marL="3657600" indent="0" algn="l" defTabSz="914400" rtl="0" eaLnBrk="1" latinLnBrk="0" hangingPunct="1">
+              <a:lnSpc>
+                <a:spcPct val="90000"/>
+              </a:lnSpc>
+              <a:spcBef>
+                <a:spcPts val="500"/>
+              </a:spcBef>
+              <a:buFont typeface="Arial" panose="020B0604020202020204" pitchFamily="34" charset="0"/>
+              <a:buNone/>
+              <a:defRPr sz="1000" kern="1200">
+                <a:solidFill>
+                  <a:schemeClr val="tx1"/>
+                </a:solidFill>
+                <a:latin typeface="+mn-lt"/>
+                <a:ea typeface="+mn-ea"/>
+                <a:cs typeface="+mn-cs"/>
+              </a:defRPr>
+            </a:lvl9pPr>
+          </a:lstStyle>
+          <a:p>
+            <a:pPr>
+              <a:lnSpc>
+                <a:spcPct val="140000"/>
+              </a:lnSpc>
+            </a:pPr>
+            <a:r>
+              <a:rPr lang="en-US" sz="1400" dirty="0"/>
+              <a:t>Fig. 16: Stats.</a:t>
+            </a:r>
+          </a:p>
+        </p:txBody>
+      </p:sp>
+      <p:sp>
+        <p:nvSpPr>
+          <p:cNvPr id="7" name="Text Placeholder 3">
+            <a:extLst>
+              <a:ext uri="{FF2B5EF4-FFF2-40B4-BE49-F238E27FC236}">
+                <a16:creationId xmlns:a16="http://schemas.microsoft.com/office/drawing/2014/main" id="{9A9710BC-3BB7-53CD-3BD9-3265CCBD67C7}"/>
+              </a:ext>
+            </a:extLst>
+          </p:cNvPr>
+          <p:cNvSpPr txBox="1">
+            <a:spLocks/>
+          </p:cNvSpPr>
+          <p:nvPr/>
+        </p:nvSpPr>
+        <p:spPr>
+          <a:xfrm>
+            <a:off x="9960801" y="6036032"/>
+            <a:ext cx="1586163" cy="535890"/>
+          </a:xfrm>
+          <a:prstGeom prst="rect">
+            <a:avLst/>
+          </a:prstGeom>
+        </p:spPr>
+        <p:txBody>
+          <a:bodyPr vert="horz" lIns="91440" tIns="45720" rIns="91440" bIns="45720" rtlCol="0">
+            <a:normAutofit fontScale="85000" lnSpcReduction="20000"/>
+          </a:bodyPr>
+          <a:lstStyle>
+            <a:lvl1pPr marL="0" indent="0" algn="l" defTabSz="914400" rtl="0" eaLnBrk="1" latinLnBrk="0" hangingPunct="1">
+              <a:lnSpc>
+                <a:spcPct val="150000"/>
+              </a:lnSpc>
+              <a:spcBef>
+                <a:spcPts val="1000"/>
+              </a:spcBef>
+              <a:buClr>
+                <a:schemeClr val="accent3"/>
+              </a:buClr>
+              <a:buFont typeface="Wingdings" panose="05000000000000000000" pitchFamily="2" charset="2"/>
+              <a:buNone/>
+              <a:defRPr sz="2000" kern="1200" spc="50">
+                <a:solidFill>
+                  <a:schemeClr val="tx1">
+                    <a:alpha val="60000"/>
+                  </a:schemeClr>
+                </a:solidFill>
+                <a:latin typeface="+mn-lt"/>
+                <a:ea typeface="+mn-ea"/>
+                <a:cs typeface="+mn-cs"/>
+              </a:defRPr>
+            </a:lvl1pPr>
+            <a:lvl2pPr marL="457200" indent="0" algn="l" defTabSz="914400" rtl="0" eaLnBrk="1" latinLnBrk="0" hangingPunct="1">
+              <a:lnSpc>
+                <a:spcPct val="150000"/>
+              </a:lnSpc>
+              <a:spcBef>
+                <a:spcPts val="500"/>
+              </a:spcBef>
+              <a:buFontTx/>
+              <a:buNone/>
+              <a:defRPr sz="1400" b="0" i="1" kern="1200" spc="50" baseline="0">
+                <a:solidFill>
+                  <a:schemeClr val="tx1">
+                    <a:alpha val="60000"/>
+                  </a:schemeClr>
+                </a:solidFill>
+                <a:latin typeface="+mn-lt"/>
+                <a:ea typeface="+mn-ea"/>
+                <a:cs typeface="+mn-cs"/>
+              </a:defRPr>
+            </a:lvl2pPr>
+            <a:lvl3pPr marL="914400" indent="0" algn="l" defTabSz="914400" rtl="0" eaLnBrk="1" latinLnBrk="0" hangingPunct="1">
+              <a:lnSpc>
+                <a:spcPct val="150000"/>
+              </a:lnSpc>
+              <a:spcBef>
+                <a:spcPts val="500"/>
+              </a:spcBef>
+              <a:buClr>
+                <a:schemeClr val="accent3"/>
+              </a:buClr>
+              <a:buFont typeface="Wingdings" panose="05000000000000000000" pitchFamily="2" charset="2"/>
+              <a:buNone/>
+              <a:defRPr sz="1200" kern="1200" spc="50">
+                <a:solidFill>
+                  <a:schemeClr val="tx1">
+                    <a:alpha val="60000"/>
+                  </a:schemeClr>
+                </a:solidFill>
+                <a:latin typeface="+mn-lt"/>
+                <a:ea typeface="+mn-ea"/>
+                <a:cs typeface="+mn-cs"/>
+              </a:defRPr>
+            </a:lvl3pPr>
+            <a:lvl4pPr marL="1371600" indent="0" algn="l" defTabSz="914400" rtl="0" eaLnBrk="1" latinLnBrk="0" hangingPunct="1">
+              <a:lnSpc>
+                <a:spcPct val="150000"/>
+              </a:lnSpc>
+              <a:spcBef>
+                <a:spcPts val="500"/>
+              </a:spcBef>
+              <a:buClr>
+                <a:schemeClr val="accent3"/>
+              </a:buClr>
+              <a:buFontTx/>
+              <a:buNone/>
+              <a:defRPr sz="1000" b="0" i="1" kern="1200" spc="50" baseline="0">
+                <a:solidFill>
+                  <a:schemeClr val="tx1">
+                    <a:alpha val="60000"/>
+                  </a:schemeClr>
+                </a:solidFill>
+                <a:latin typeface="+mn-lt"/>
+                <a:ea typeface="+mn-ea"/>
+                <a:cs typeface="+mn-cs"/>
+              </a:defRPr>
+            </a:lvl4pPr>
+            <a:lvl5pPr marL="1828800" indent="0" algn="l" defTabSz="914400" rtl="0" eaLnBrk="1" latinLnBrk="0" hangingPunct="1">
+              <a:lnSpc>
+                <a:spcPct val="150000"/>
+              </a:lnSpc>
+              <a:spcBef>
+                <a:spcPts val="500"/>
+              </a:spcBef>
+              <a:buClr>
+                <a:schemeClr val="accent3"/>
+              </a:buClr>
+              <a:buFont typeface="Wingdings" panose="05000000000000000000" pitchFamily="2" charset="2"/>
+              <a:buNone/>
+              <a:defRPr sz="1000" kern="1200" spc="50">
+                <a:solidFill>
+                  <a:schemeClr val="tx1">
+                    <a:alpha val="60000"/>
+                  </a:schemeClr>
+                </a:solidFill>
+                <a:latin typeface="+mn-lt"/>
+                <a:ea typeface="+mn-ea"/>
+                <a:cs typeface="+mn-cs"/>
+              </a:defRPr>
+            </a:lvl5pPr>
+            <a:lvl6pPr marL="2286000" indent="0" algn="l" defTabSz="914400" rtl="0" eaLnBrk="1" latinLnBrk="0" hangingPunct="1">
+              <a:lnSpc>
+                <a:spcPct val="90000"/>
+              </a:lnSpc>
+              <a:spcBef>
+                <a:spcPts val="500"/>
+              </a:spcBef>
+              <a:buFont typeface="Arial" panose="020B0604020202020204" pitchFamily="34" charset="0"/>
+              <a:buNone/>
+              <a:defRPr sz="1000" kern="1200">
+                <a:solidFill>
+                  <a:schemeClr val="tx1"/>
+                </a:solidFill>
+                <a:latin typeface="+mn-lt"/>
+                <a:ea typeface="+mn-ea"/>
+                <a:cs typeface="+mn-cs"/>
+              </a:defRPr>
+            </a:lvl6pPr>
+            <a:lvl7pPr marL="2743200" indent="0" algn="l" defTabSz="914400" rtl="0" eaLnBrk="1" latinLnBrk="0" hangingPunct="1">
+              <a:lnSpc>
+                <a:spcPct val="90000"/>
+              </a:lnSpc>
+              <a:spcBef>
+                <a:spcPts val="500"/>
+              </a:spcBef>
+              <a:buFont typeface="Arial" panose="020B0604020202020204" pitchFamily="34" charset="0"/>
+              <a:buNone/>
+              <a:defRPr sz="1000" kern="1200">
+                <a:solidFill>
+                  <a:schemeClr val="tx1"/>
+                </a:solidFill>
+                <a:latin typeface="+mn-lt"/>
+                <a:ea typeface="+mn-ea"/>
+                <a:cs typeface="+mn-cs"/>
+              </a:defRPr>
+            </a:lvl7pPr>
+            <a:lvl8pPr marL="3200400" indent="0" algn="l" defTabSz="914400" rtl="0" eaLnBrk="1" latinLnBrk="0" hangingPunct="1">
+              <a:lnSpc>
+                <a:spcPct val="90000"/>
+              </a:lnSpc>
+              <a:spcBef>
+                <a:spcPts val="500"/>
+              </a:spcBef>
+              <a:buFont typeface="Arial" panose="020B0604020202020204" pitchFamily="34" charset="0"/>
+              <a:buNone/>
+              <a:defRPr sz="1000" kern="1200">
+                <a:solidFill>
+                  <a:schemeClr val="tx1"/>
+                </a:solidFill>
+                <a:latin typeface="+mn-lt"/>
+                <a:ea typeface="+mn-ea"/>
+                <a:cs typeface="+mn-cs"/>
+              </a:defRPr>
+            </a:lvl8pPr>
+            <a:lvl9pPr marL="3657600" indent="0" algn="l" defTabSz="914400" rtl="0" eaLnBrk="1" latinLnBrk="0" hangingPunct="1">
+              <a:lnSpc>
+                <a:spcPct val="90000"/>
+              </a:lnSpc>
+              <a:spcBef>
+                <a:spcPts val="500"/>
+              </a:spcBef>
+              <a:buFont typeface="Arial" panose="020B0604020202020204" pitchFamily="34" charset="0"/>
+              <a:buNone/>
+              <a:defRPr sz="1000" kern="1200">
+                <a:solidFill>
+                  <a:schemeClr val="tx1"/>
+                </a:solidFill>
+                <a:latin typeface="+mn-lt"/>
+                <a:ea typeface="+mn-ea"/>
+                <a:cs typeface="+mn-cs"/>
+              </a:defRPr>
+            </a:lvl9pPr>
+          </a:lstStyle>
+          <a:p>
+            <a:pPr>
+              <a:lnSpc>
+                <a:spcPct val="140000"/>
+              </a:lnSpc>
+            </a:pPr>
+            <a:r>
+              <a:rPr lang="en-US" sz="1400" dirty="0"/>
+              <a:t>Fig. 17: Project repository.</a:t>
+            </a:r>
+          </a:p>
+        </p:txBody>
+      </p:sp>
     </p:spTree>
     <p:extLst>
       <p:ext uri="{BB962C8B-B14F-4D97-AF65-F5344CB8AC3E}">
@@ -18193,11 +20001,22 @@
             </a:pPr>
             <a:r>
               <a:rPr lang="en-US" sz="1600" dirty="0">
-                <a:hlinkClick r:id="rId2"/>
-              </a:rPr>
-              <a:t>https://discordjs.guide/</a:t>
-            </a:r>
-            <a:endParaRPr lang="en-US" sz="1600" dirty="0"/>
+                <a:effectLst/>
+              </a:rPr>
+              <a:t>“Discord.js Guide.” </a:t>
+            </a:r>
+            <a:r>
+              <a:rPr lang="en-US" sz="1600" i="1" dirty="0">
+                <a:effectLst/>
+              </a:rPr>
+              <a:t>Introduction | Discord.js Guide</a:t>
+            </a:r>
+            <a:r>
+              <a:rPr lang="en-US" sz="1600" dirty="0">
+                <a:effectLst/>
+              </a:rPr>
+              <a:t>, https://discordjs.guide/. </a:t>
+            </a:r>
           </a:p>
           <a:p>
             <a:pPr>
@@ -18205,12 +20024,17 @@
               <a:buAutoNum type="arabicPeriod"/>
             </a:pPr>
             <a:r>
-              <a:rPr lang="en-US" sz="1600" dirty="0">
-                <a:hlinkClick r:id="rId3"/>
-              </a:rPr>
-              <a:t>https://discord.com/developers/docs/reference</a:t>
-            </a:r>
-            <a:endParaRPr lang="en-US" sz="1600" dirty="0"/>
+              <a:rPr lang="en-US" sz="1600" dirty="0"/>
+              <a:t>“Discord Developer Portal.” </a:t>
+            </a:r>
+            <a:r>
+              <a:rPr lang="en-US" sz="1600" i="1" dirty="0"/>
+              <a:t>Discord</a:t>
+            </a:r>
+            <a:r>
+              <a:rPr lang="en-US" sz="1600" dirty="0"/>
+              <a:t>, https://discord.com/developers/docs/reference.</a:t>
+            </a:r>
           </a:p>
           <a:p>
             <a:pPr>
@@ -18219,21 +20043,8 @@
             </a:pPr>
             <a:r>
               <a:rPr lang="en-US" sz="1600" dirty="0"/>
-              <a:t>Fig. 1: Santosa, William. “Active Developer badge screenshot.” Online, 16 Jan. 2023. Accessed 16 Jan. 2023.</a:t>
-            </a:r>
-          </a:p>
-          <a:p>
-            <a:pPr>
-              <a:buFont typeface="+mj-lt"/>
-              <a:buAutoNum type="arabicPeriod"/>
-            </a:pPr>
-            <a:r>
-              <a:rPr lang="en-US" sz="1600" dirty="0"/>
-              <a:t>Fig. 2: Santosa, William. “Directory after running commands screenshot.” Online, 16 Jan. 2023. Accessed 16 Jan. 2023.</a:t>
-            </a:r>
-          </a:p>
-          <a:p>
-            <a:endParaRPr lang="en-US" sz="1600" dirty="0"/>
+              <a:t>Figs. 1-17: Santosa, William. Assorted screenshots. Online, 16 Jan. 2023. </a:t>
+            </a:r>
           </a:p>
         </p:txBody>
       </p:sp>

</xml_diff>